<commit_message>
poster draft printed (v 0.11)
</commit_message>
<xml_diff>
--- a/pubs/2016-talks/2016-06-09-cpa/ppt/koval-etal-2016-06-10-cpa.pptx
+++ b/pubs/2016-talks/2016-06-09-cpa/ppt/koval-etal-2016-06-10-cpa.pptx
@@ -11,47 +11,17 @@
     <p:sldId id="296" r:id="rId5"/>
     <p:sldId id="288" r:id="rId6"/>
     <p:sldId id="289" r:id="rId7"/>
-    <p:sldId id="299" r:id="rId8"/>
-    <p:sldId id="298" r:id="rId9"/>
-    <p:sldId id="290" r:id="rId10"/>
-    <p:sldId id="300" r:id="rId11"/>
-    <p:sldId id="303" r:id="rId12"/>
-    <p:sldId id="301" r:id="rId13"/>
-    <p:sldId id="291" r:id="rId14"/>
-    <p:sldId id="302" r:id="rId15"/>
-    <p:sldId id="292" r:id="rId16"/>
-    <p:sldId id="293" r:id="rId17"/>
-    <p:sldId id="294" r:id="rId18"/>
-    <p:sldId id="295" r:id="rId19"/>
-    <p:sldId id="269" r:id="rId20"/>
-    <p:sldId id="257" r:id="rId21"/>
-    <p:sldId id="258" r:id="rId22"/>
-    <p:sldId id="259" r:id="rId23"/>
-    <p:sldId id="260" r:id="rId24"/>
-    <p:sldId id="261" r:id="rId25"/>
-    <p:sldId id="262" r:id="rId26"/>
-    <p:sldId id="263" r:id="rId27"/>
-    <p:sldId id="264" r:id="rId28"/>
-    <p:sldId id="265" r:id="rId29"/>
-    <p:sldId id="266" r:id="rId30"/>
-    <p:sldId id="267" r:id="rId31"/>
-    <p:sldId id="268" r:id="rId32"/>
-    <p:sldId id="270" r:id="rId33"/>
-    <p:sldId id="271" r:id="rId34"/>
-    <p:sldId id="272" r:id="rId35"/>
-    <p:sldId id="273" r:id="rId36"/>
-    <p:sldId id="274" r:id="rId37"/>
-    <p:sldId id="275" r:id="rId38"/>
-    <p:sldId id="276" r:id="rId39"/>
-    <p:sldId id="277" r:id="rId40"/>
-    <p:sldId id="278" r:id="rId41"/>
-    <p:sldId id="279" r:id="rId42"/>
-    <p:sldId id="280" r:id="rId43"/>
-    <p:sldId id="281" r:id="rId44"/>
-    <p:sldId id="282" r:id="rId45"/>
-    <p:sldId id="283" r:id="rId46"/>
-    <p:sldId id="284" r:id="rId47"/>
-    <p:sldId id="285" r:id="rId48"/>
+    <p:sldId id="307" r:id="rId8"/>
+    <p:sldId id="300" r:id="rId9"/>
+    <p:sldId id="304" r:id="rId10"/>
+    <p:sldId id="305" r:id="rId11"/>
+    <p:sldId id="306" r:id="rId12"/>
+    <p:sldId id="292" r:id="rId13"/>
+    <p:sldId id="293" r:id="rId14"/>
+    <p:sldId id="294" r:id="rId15"/>
+    <p:sldId id="295" r:id="rId16"/>
+    <p:sldId id="269" r:id="rId17"/>
+    <p:sldId id="257" r:id="rId18"/>
   </p:sldIdLst>
   <p:sldSz cx="9144000" cy="5143500" type="screen16x9"/>
   <p:notesSz cx="6858000" cy="9144000"/>
@@ -150,6 +120,11 @@
       </a:defRPr>
     </a:lvl9pPr>
   </p:defaultTextStyle>
+  <p:extLst>
+    <p:ext uri="{EFAFB233-063F-42B5-8137-9DF3F51BA10A}">
+      <p15:sldGuideLst xmlns:p15="http://schemas.microsoft.com/office/powerpoint/2012/main"/>
+    </p:ext>
+  </p:extLst>
 </p:presentation>
 </file>
 
@@ -3031,6 +3006,379 @@
           <a:chExt cx="0" cy="0"/>
         </a:xfrm>
       </p:grpSpPr>
+      <p:sp>
+        <p:nvSpPr>
+          <p:cNvPr id="2" name="Rectangle 1"/>
+          <p:cNvSpPr/>
+          <p:nvPr/>
+        </p:nvSpPr>
+        <p:spPr>
+          <a:xfrm>
+            <a:off x="255104" y="1322087"/>
+            <a:ext cx="8209722" cy="1077218"/>
+          </a:xfrm>
+          <a:prstGeom prst="rect">
+            <a:avLst/>
+          </a:prstGeom>
+        </p:spPr>
+        <p:txBody>
+          <a:bodyPr wrap="square">
+            <a:spAutoFit/>
+          </a:bodyPr>
+          <a:lstStyle/>
+          <a:p>
+            <a:r>
+              <a:rPr lang="en-US" sz="4000" dirty="0">
+                <a:latin typeface="Gill Sans MT" panose="020B0502020104020203" pitchFamily="34" charset="0"/>
+                <a:ea typeface="MS Mincho"/>
+              </a:rPr>
+              <a:t>Big Data, Big Analysis: </a:t>
+            </a:r>
+            <a:endParaRPr lang="en-US" sz="4000" dirty="0" smtClean="0">
+              <a:latin typeface="Gill Sans MT" panose="020B0502020104020203" pitchFamily="34" charset="0"/>
+              <a:ea typeface="MS Mincho"/>
+            </a:endParaRPr>
+          </a:p>
+          <a:p>
+            <a:r>
+              <a:rPr lang="en-US" sz="2400" dirty="0" smtClean="0">
+                <a:latin typeface="Gill Sans MT" panose="020B0502020104020203" pitchFamily="34" charset="0"/>
+                <a:ea typeface="MS Mincho"/>
+              </a:rPr>
+              <a:t>A </a:t>
+            </a:r>
+            <a:r>
+              <a:rPr lang="en-US" sz="2400" dirty="0">
+                <a:latin typeface="Gill Sans MT" panose="020B0502020104020203" pitchFamily="34" charset="0"/>
+                <a:ea typeface="MS Mincho"/>
+              </a:rPr>
+              <a:t>Collaborative Modeling Framework for Multi-study Replication</a:t>
+            </a:r>
+            <a:endParaRPr lang="en-US" sz="1800" dirty="0">
+              <a:effectLst/>
+              <a:latin typeface="Gill Sans MT" panose="020B0502020104020203" pitchFamily="34" charset="0"/>
+              <a:ea typeface="Times New Roman" panose="02020603050405020304" pitchFamily="18" charset="0"/>
+            </a:endParaRPr>
+          </a:p>
+        </p:txBody>
+      </p:sp>
+      <p:pic>
+        <p:nvPicPr>
+          <p:cNvPr id="5" name="Picture 4"/>
+          <p:cNvPicPr>
+            <a:picLocks noChangeAspect="1"/>
+          </p:cNvPicPr>
+          <p:nvPr/>
+        </p:nvPicPr>
+        <p:blipFill>
+          <a:blip r:embed="rId2">
+            <a:extLst>
+              <a:ext uri="{28A0092B-C50C-407E-A947-70E740481C1C}">
+                <a14:useLocalDpi xmlns:a14="http://schemas.microsoft.com/office/drawing/2010/main" val="0"/>
+              </a:ext>
+            </a:extLst>
+          </a:blip>
+          <a:stretch>
+            <a:fillRect/>
+          </a:stretch>
+        </p:blipFill>
+        <p:spPr>
+          <a:xfrm>
+            <a:off x="86138" y="0"/>
+            <a:ext cx="8997159" cy="1040296"/>
+          </a:xfrm>
+          <a:prstGeom prst="rect">
+            <a:avLst/>
+          </a:prstGeom>
+        </p:spPr>
+      </p:pic>
+      <p:grpSp>
+        <p:nvGrpSpPr>
+          <p:cNvPr id="12" name="Group 11"/>
+          <p:cNvGrpSpPr/>
+          <p:nvPr/>
+        </p:nvGrpSpPr>
+        <p:grpSpPr>
+          <a:xfrm>
+            <a:off x="1440961" y="2978859"/>
+            <a:ext cx="5843947" cy="1241357"/>
+            <a:chOff x="1394579" y="2733693"/>
+            <a:chExt cx="5843947" cy="1241357"/>
+          </a:xfrm>
+        </p:grpSpPr>
+        <p:sp>
+          <p:nvSpPr>
+            <p:cNvPr id="6" name="TextBox 5"/>
+            <p:cNvSpPr txBox="1"/>
+            <p:nvPr/>
+          </p:nvSpPr>
+          <p:spPr>
+            <a:xfrm>
+              <a:off x="2312505" y="2733693"/>
+              <a:ext cx="1656351" cy="507831"/>
+            </a:xfrm>
+            <a:prstGeom prst="rect">
+              <a:avLst/>
+            </a:prstGeom>
+            <a:noFill/>
+          </p:spPr>
+          <p:txBody>
+            <a:bodyPr wrap="none" rtlCol="0">
+              <a:spAutoFit/>
+            </a:bodyPr>
+            <a:lstStyle/>
+            <a:p>
+              <a:pPr algn="ctr"/>
+              <a:r>
+                <a:rPr lang="en-US" b="1" dirty="0" smtClean="0"/>
+                <a:t>Andriy V. Koval</a:t>
+              </a:r>
+            </a:p>
+            <a:p>
+              <a:pPr algn="ctr"/>
+              <a:r>
+                <a:rPr lang="en-US" i="1" dirty="0" smtClean="0">
+                  <a:latin typeface="+mj-lt"/>
+                </a:rPr>
+                <a:t>University of Victoria</a:t>
+              </a:r>
+              <a:endParaRPr lang="en-US" i="1" dirty="0">
+                <a:latin typeface="+mj-lt"/>
+              </a:endParaRPr>
+            </a:p>
+          </p:txBody>
+        </p:sp>
+        <p:sp>
+          <p:nvSpPr>
+            <p:cNvPr id="7" name="TextBox 6"/>
+            <p:cNvSpPr txBox="1"/>
+            <p:nvPr/>
+          </p:nvSpPr>
+          <p:spPr>
+            <a:xfrm>
+              <a:off x="4466907" y="2733693"/>
+              <a:ext cx="1806905" cy="507831"/>
+            </a:xfrm>
+            <a:prstGeom prst="rect">
+              <a:avLst/>
+            </a:prstGeom>
+            <a:noFill/>
+          </p:spPr>
+          <p:txBody>
+            <a:bodyPr wrap="none" rtlCol="0">
+              <a:spAutoFit/>
+            </a:bodyPr>
+            <a:lstStyle/>
+            <a:p>
+              <a:pPr algn="ctr"/>
+              <a:r>
+                <a:rPr lang="en-US" b="1" dirty="0" smtClean="0"/>
+                <a:t>William H. Beasley</a:t>
+              </a:r>
+            </a:p>
+            <a:p>
+              <a:pPr algn="ctr"/>
+              <a:r>
+                <a:rPr lang="en-US" i="1" dirty="0" smtClean="0">
+                  <a:latin typeface="+mj-lt"/>
+                </a:rPr>
+                <a:t>University of Oklahoma</a:t>
+              </a:r>
+              <a:endParaRPr lang="en-US" i="1" dirty="0">
+                <a:latin typeface="+mj-lt"/>
+              </a:endParaRPr>
+            </a:p>
+          </p:txBody>
+        </p:sp>
+        <p:sp>
+          <p:nvSpPr>
+            <p:cNvPr id="8" name="TextBox 7"/>
+            <p:cNvSpPr txBox="1"/>
+            <p:nvPr/>
+          </p:nvSpPr>
+          <p:spPr>
+            <a:xfrm>
+              <a:off x="1394579" y="3467219"/>
+              <a:ext cx="1623650" cy="507831"/>
+            </a:xfrm>
+            <a:prstGeom prst="rect">
+              <a:avLst/>
+            </a:prstGeom>
+            <a:noFill/>
+          </p:spPr>
+          <p:txBody>
+            <a:bodyPr wrap="none" rtlCol="0">
+              <a:spAutoFit/>
+            </a:bodyPr>
+            <a:lstStyle/>
+            <a:p>
+              <a:pPr algn="ctr"/>
+              <a:r>
+                <a:rPr lang="en-US" b="1" dirty="0" smtClean="0"/>
+                <a:t>Andrea Piccinin</a:t>
+              </a:r>
+            </a:p>
+            <a:p>
+              <a:pPr algn="ctr"/>
+              <a:r>
+                <a:rPr lang="en-US" i="1" dirty="0" smtClean="0">
+                  <a:latin typeface="+mj-lt"/>
+                </a:rPr>
+                <a:t>University of Victoria</a:t>
+              </a:r>
+              <a:endParaRPr lang="en-US" i="1" dirty="0">
+                <a:latin typeface="+mj-lt"/>
+              </a:endParaRPr>
+            </a:p>
+          </p:txBody>
+        </p:sp>
+        <p:sp>
+          <p:nvSpPr>
+            <p:cNvPr id="9" name="TextBox 8"/>
+            <p:cNvSpPr txBox="1"/>
+            <p:nvPr/>
+          </p:nvSpPr>
+          <p:spPr>
+            <a:xfrm>
+              <a:off x="3370300" y="3467219"/>
+              <a:ext cx="1859805" cy="507831"/>
+            </a:xfrm>
+            <a:prstGeom prst="rect">
+              <a:avLst/>
+            </a:prstGeom>
+            <a:noFill/>
+          </p:spPr>
+          <p:txBody>
+            <a:bodyPr wrap="none" rtlCol="0">
+              <a:spAutoFit/>
+            </a:bodyPr>
+            <a:lstStyle/>
+            <a:p>
+              <a:pPr algn="ctr"/>
+              <a:r>
+                <a:rPr lang="en-US" b="1" dirty="0" smtClean="0"/>
+                <a:t>Graciela Muniz-</a:t>
+              </a:r>
+              <a:r>
+                <a:rPr lang="en-US" b="1" dirty="0" err="1" smtClean="0"/>
+                <a:t>Terrera</a:t>
+              </a:r>
+              <a:endParaRPr lang="en-US" b="1" dirty="0" smtClean="0"/>
+            </a:p>
+            <a:p>
+              <a:pPr algn="ctr"/>
+              <a:r>
+                <a:rPr lang="en-US" i="1" dirty="0" smtClean="0">
+                  <a:latin typeface="+mj-lt"/>
+                </a:rPr>
+                <a:t>University </a:t>
+              </a:r>
+              <a:r>
+                <a:rPr lang="en-US" i="1" dirty="0">
+                  <a:latin typeface="+mj-lt"/>
+                </a:rPr>
+                <a:t>of </a:t>
+              </a:r>
+              <a:r>
+                <a:rPr lang="en-US" i="1" dirty="0" smtClean="0">
+                  <a:latin typeface="+mj-lt"/>
+                </a:rPr>
+                <a:t>Edinburgh</a:t>
+              </a:r>
+              <a:endParaRPr lang="en-US" i="1" dirty="0">
+                <a:latin typeface="+mj-lt"/>
+              </a:endParaRPr>
+            </a:p>
+          </p:txBody>
+        </p:sp>
+        <p:sp>
+          <p:nvSpPr>
+            <p:cNvPr id="10" name="TextBox 9"/>
+            <p:cNvSpPr txBox="1"/>
+            <p:nvPr/>
+          </p:nvSpPr>
+          <p:spPr>
+            <a:xfrm>
+              <a:off x="5582175" y="3467219"/>
+              <a:ext cx="1656351" cy="507831"/>
+            </a:xfrm>
+            <a:prstGeom prst="rect">
+              <a:avLst/>
+            </a:prstGeom>
+            <a:noFill/>
+          </p:spPr>
+          <p:txBody>
+            <a:bodyPr wrap="none" rtlCol="0">
+              <a:spAutoFit/>
+            </a:bodyPr>
+            <a:lstStyle/>
+            <a:p>
+              <a:pPr algn="ctr"/>
+              <a:r>
+                <a:rPr lang="en-US" b="1" dirty="0" smtClean="0"/>
+                <a:t>Scott Hofer</a:t>
+              </a:r>
+            </a:p>
+            <a:p>
+              <a:pPr algn="ctr"/>
+              <a:r>
+                <a:rPr lang="en-US" i="1" dirty="0" smtClean="0">
+                  <a:latin typeface="+mj-lt"/>
+                </a:rPr>
+                <a:t>University of Victoria</a:t>
+              </a:r>
+              <a:endParaRPr lang="en-US" i="1" dirty="0">
+                <a:latin typeface="+mj-lt"/>
+              </a:endParaRPr>
+            </a:p>
+          </p:txBody>
+        </p:sp>
+      </p:grpSp>
+      <p:sp>
+        <p:nvSpPr>
+          <p:cNvPr id="11" name="TextBox 10"/>
+          <p:cNvSpPr txBox="1"/>
+          <p:nvPr/>
+        </p:nvSpPr>
+        <p:spPr>
+          <a:xfrm>
+            <a:off x="0" y="4604853"/>
+            <a:ext cx="9144000" cy="400110"/>
+          </a:xfrm>
+          <a:prstGeom prst="rect">
+            <a:avLst/>
+          </a:prstGeom>
+          <a:noFill/>
+        </p:spPr>
+        <p:txBody>
+          <a:bodyPr wrap="square" rtlCol="0">
+            <a:spAutoFit/>
+          </a:bodyPr>
+          <a:lstStyle/>
+          <a:p>
+            <a:pPr algn="ctr"/>
+            <a:r>
+              <a:rPr lang="en-US" sz="2000" dirty="0" smtClean="0">
+                <a:solidFill>
+                  <a:schemeClr val="bg1">
+                    <a:lumMod val="65000"/>
+                  </a:schemeClr>
+                </a:solidFill>
+                <a:latin typeface="+mj-lt"/>
+              </a:rPr>
+              <a:t>Convention of Canadian Psychological Association | Victoria, BC | June 10, 2016 </a:t>
+            </a:r>
+            <a:endParaRPr lang="en-US" sz="2000" dirty="0">
+              <a:solidFill>
+                <a:schemeClr val="bg1">
+                  <a:lumMod val="65000"/>
+                </a:schemeClr>
+              </a:solidFill>
+              <a:latin typeface="+mj-lt"/>
+            </a:endParaRPr>
+          </a:p>
+        </p:txBody>
+      </p:sp>
     </p:spTree>
     <p:extLst>
       <p:ext uri="{BB962C8B-B14F-4D97-AF65-F5344CB8AC3E}">
@@ -3041,6 +3389,13 @@
   <p:clrMapOvr>
     <a:masterClrMapping/>
   </p:clrMapOvr>
+  <p:timing>
+    <p:tnLst>
+      <p:par>
+        <p:cTn id="1" dur="indefinite" restart="never" nodeType="tmRoot"/>
+      </p:par>
+    </p:tnLst>
+  </p:timing>
 </p:sld>
 </file>
 
@@ -3061,16 +3416,181 @@
           <a:chExt cx="0" cy="0"/>
         </a:xfrm>
       </p:grpSpPr>
-      <p:sp>
-        <p:nvSpPr>
-          <p:cNvPr id="5" name="Rounded Rectangle 4"/>
+      <p:pic>
+        <p:nvPicPr>
+          <p:cNvPr id="10" name="Picture 9"/>
+          <p:cNvPicPr>
+            <a:picLocks noChangeAspect="1"/>
+          </p:cNvPicPr>
+          <p:nvPr/>
+        </p:nvPicPr>
+        <p:blipFill>
+          <a:blip r:embed="rId2" cstate="print">
+            <a:extLst>
+              <a:ext uri="{28A0092B-C50C-407E-A947-70E740481C1C}">
+                <a14:useLocalDpi xmlns:a14="http://schemas.microsoft.com/office/drawing/2010/main" val="0"/>
+              </a:ext>
+            </a:extLst>
+          </a:blip>
+          <a:stretch>
+            <a:fillRect/>
+          </a:stretch>
+        </p:blipFill>
+        <p:spPr>
+          <a:xfrm>
+            <a:off x="197809" y="2467664"/>
+            <a:ext cx="2544008" cy="1034690"/>
+          </a:xfrm>
+          <a:prstGeom prst="rect">
+            <a:avLst/>
+          </a:prstGeom>
+        </p:spPr>
+      </p:pic>
+      <p:pic>
+        <p:nvPicPr>
+          <p:cNvPr id="11" name="Picture 10"/>
+          <p:cNvPicPr>
+            <a:picLocks noChangeAspect="1"/>
+          </p:cNvPicPr>
+          <p:nvPr/>
+        </p:nvPicPr>
+        <p:blipFill>
+          <a:blip r:embed="rId3" cstate="print">
+            <a:extLst>
+              <a:ext uri="{28A0092B-C50C-407E-A947-70E740481C1C}">
+                <a14:useLocalDpi xmlns:a14="http://schemas.microsoft.com/office/drawing/2010/main" val="0"/>
+              </a:ext>
+            </a:extLst>
+          </a:blip>
+          <a:stretch>
+            <a:fillRect/>
+          </a:stretch>
+        </p:blipFill>
+        <p:spPr>
+          <a:xfrm>
+            <a:off x="62886" y="3697266"/>
+            <a:ext cx="4039280" cy="745953"/>
+          </a:xfrm>
+          <a:prstGeom prst="rect">
+            <a:avLst/>
+          </a:prstGeom>
+        </p:spPr>
+      </p:pic>
+      <p:pic>
+        <p:nvPicPr>
+          <p:cNvPr id="12" name="Picture 11"/>
+          <p:cNvPicPr>
+            <a:picLocks noChangeAspect="1"/>
+          </p:cNvPicPr>
+          <p:nvPr/>
+        </p:nvPicPr>
+        <p:blipFill>
+          <a:blip r:embed="rId4">
+            <a:extLst>
+              <a:ext uri="{28A0092B-C50C-407E-A947-70E740481C1C}">
+                <a14:useLocalDpi xmlns:a14="http://schemas.microsoft.com/office/drawing/2010/main" val="0"/>
+              </a:ext>
+            </a:extLst>
+          </a:blip>
+          <a:stretch>
+            <a:fillRect/>
+          </a:stretch>
+        </p:blipFill>
+        <p:spPr>
+          <a:xfrm>
+            <a:off x="0" y="4614140"/>
+            <a:ext cx="9144000" cy="529360"/>
+          </a:xfrm>
+          <a:prstGeom prst="rect">
+            <a:avLst/>
+          </a:prstGeom>
+        </p:spPr>
+      </p:pic>
+      <p:grpSp>
+        <p:nvGrpSpPr>
+          <p:cNvPr id="18" name="Group 17"/>
+          <p:cNvGrpSpPr/>
+          <p:nvPr/>
+        </p:nvGrpSpPr>
+        <p:grpSpPr>
+          <a:xfrm>
+            <a:off x="3384694" y="1712507"/>
+            <a:ext cx="2196966" cy="2496486"/>
+            <a:chOff x="-91938" y="29352"/>
+            <a:chExt cx="7102806" cy="6966150"/>
+          </a:xfrm>
+        </p:grpSpPr>
+        <p:pic>
+          <p:nvPicPr>
+            <p:cNvPr id="19" name="Picture 18"/>
+            <p:cNvPicPr>
+              <a:picLocks noChangeAspect="1"/>
+            </p:cNvPicPr>
+            <p:nvPr/>
+          </p:nvPicPr>
+          <p:blipFill>
+            <a:blip r:embed="rId5" cstate="print">
+              <a:extLst>
+                <a:ext uri="{28A0092B-C50C-407E-A947-70E740481C1C}">
+                  <a14:useLocalDpi xmlns:a14="http://schemas.microsoft.com/office/drawing/2010/main" val="0"/>
+                </a:ext>
+              </a:extLst>
+            </a:blip>
+            <a:stretch>
+              <a:fillRect/>
+            </a:stretch>
+          </p:blipFill>
+          <p:spPr>
+            <a:xfrm>
+              <a:off x="-91938" y="29352"/>
+              <a:ext cx="3814280" cy="5143500"/>
+            </a:xfrm>
+            <a:prstGeom prst="rect">
+              <a:avLst/>
+            </a:prstGeom>
+          </p:spPr>
+        </p:pic>
+        <p:pic>
+          <p:nvPicPr>
+            <p:cNvPr id="20" name="Picture 19"/>
+            <p:cNvPicPr>
+              <a:picLocks noChangeAspect="1"/>
+            </p:cNvPicPr>
+            <p:nvPr/>
+          </p:nvPicPr>
+          <p:blipFill>
+            <a:blip r:embed="rId6" cstate="print">
+              <a:extLst>
+                <a:ext uri="{28A0092B-C50C-407E-A947-70E740481C1C}">
+                  <a14:useLocalDpi xmlns:a14="http://schemas.microsoft.com/office/drawing/2010/main" val="0"/>
+                </a:ext>
+              </a:extLst>
+            </a:blip>
+            <a:stretch>
+              <a:fillRect/>
+            </a:stretch>
+          </p:blipFill>
+          <p:spPr>
+            <a:xfrm>
+              <a:off x="2190900" y="1852002"/>
+              <a:ext cx="4819968" cy="5143500"/>
+            </a:xfrm>
+            <a:prstGeom prst="rect">
+              <a:avLst/>
+            </a:prstGeom>
+          </p:spPr>
+        </p:pic>
+      </p:grpSp>
+      <p:sp>
+        <p:nvSpPr>
+          <p:cNvPr id="13" name="Rounded Rectangle 12"/>
           <p:cNvSpPr/>
           <p:nvPr/>
         </p:nvSpPr>
         <p:spPr>
           <a:xfrm>
-            <a:off x="2042160" y="160020"/>
-            <a:ext cx="1920240" cy="472440"/>
+            <a:off x="3467100" y="190499"/>
+            <a:ext cx="561561" cy="1522007"/>
           </a:xfrm>
           <a:prstGeom prst="roundRect">
             <a:avLst/>
@@ -3112,6 +3632,43 @@
           </a:p>
         </p:txBody>
       </p:sp>
+    </p:spTree>
+    <p:extLst>
+      <p:ext uri="{BB962C8B-B14F-4D97-AF65-F5344CB8AC3E}">
+        <p14:creationId xmlns:p14="http://schemas.microsoft.com/office/powerpoint/2010/main" val="3313788840"/>
+      </p:ext>
+    </p:extLst>
+  </p:cSld>
+  <p:clrMapOvr>
+    <a:masterClrMapping/>
+  </p:clrMapOvr>
+  <p:timing>
+    <p:tnLst>
+      <p:par>
+        <p:cTn id="1" dur="indefinite" restart="never" nodeType="tmRoot"/>
+      </p:par>
+    </p:tnLst>
+  </p:timing>
+</p:sld>
+</file>
+
+<file path=ppt/slides/slide11.xml><?xml version="1.0" encoding="utf-8"?>
+<p:sld xmlns:a="http://schemas.openxmlformats.org/drawingml/2006/main" xmlns:r="http://schemas.openxmlformats.org/officeDocument/2006/relationships" xmlns:p="http://schemas.openxmlformats.org/presentationml/2006/main">
+  <p:cSld>
+    <p:spTree>
+      <p:nvGrpSpPr>
+        <p:cNvPr id="1" name=""/>
+        <p:cNvGrpSpPr/>
+        <p:nvPr/>
+      </p:nvGrpSpPr>
+      <p:grpSpPr>
+        <a:xfrm>
+          <a:off x="0" y="0"/>
+          <a:ext cx="0" cy="0"/>
+          <a:chOff x="0" y="0"/>
+          <a:chExt cx="0" cy="0"/>
+        </a:xfrm>
+      </p:grpSpPr>
       <p:pic>
         <p:nvPicPr>
           <p:cNvPr id="10" name="Picture 9"/>
@@ -3382,53 +3939,16 @@
           </p:spPr>
         </p:pic>
       </p:grpSp>
-    </p:spTree>
-    <p:extLst>
-      <p:ext uri="{BB962C8B-B14F-4D97-AF65-F5344CB8AC3E}">
-        <p14:creationId xmlns:p14="http://schemas.microsoft.com/office/powerpoint/2010/main" val="1613626613"/>
-      </p:ext>
-    </p:extLst>
-  </p:cSld>
-  <p:clrMapOvr>
-    <a:masterClrMapping/>
-  </p:clrMapOvr>
-  <p:timing>
-    <p:tnLst>
-      <p:par>
-        <p:cTn id="1" dur="indefinite" restart="never" nodeType="tmRoot"/>
-      </p:par>
-    </p:tnLst>
-  </p:timing>
-</p:sld>
-</file>
-
-<file path=ppt/slides/slide11.xml><?xml version="1.0" encoding="utf-8"?>
-<p:sld xmlns:a="http://schemas.openxmlformats.org/drawingml/2006/main" xmlns:r="http://schemas.openxmlformats.org/officeDocument/2006/relationships" xmlns:p="http://schemas.openxmlformats.org/presentationml/2006/main">
-  <p:cSld>
-    <p:spTree>
-      <p:nvGrpSpPr>
-        <p:cNvPr id="1" name=""/>
-        <p:cNvGrpSpPr/>
-        <p:nvPr/>
-      </p:nvGrpSpPr>
-      <p:grpSpPr>
-        <a:xfrm>
-          <a:off x="0" y="0"/>
-          <a:ext cx="0" cy="0"/>
-          <a:chOff x="0" y="0"/>
-          <a:chExt cx="0" cy="0"/>
-        </a:xfrm>
-      </p:grpSpPr>
-      <p:sp>
-        <p:nvSpPr>
-          <p:cNvPr id="5" name="Rounded Rectangle 4"/>
+      <p:sp>
+        <p:nvSpPr>
+          <p:cNvPr id="13" name="Rounded Rectangle 12"/>
           <p:cNvSpPr/>
           <p:nvPr/>
         </p:nvSpPr>
         <p:spPr>
           <a:xfrm>
-            <a:off x="2042160" y="160020"/>
-            <a:ext cx="1920240" cy="472440"/>
+            <a:off x="3467099" y="1285650"/>
+            <a:ext cx="2271091" cy="426856"/>
           </a:xfrm>
           <a:prstGeom prst="roundRect">
             <a:avLst/>
@@ -3470,175 +3990,10 @@
           </a:p>
         </p:txBody>
       </p:sp>
-      <p:pic>
-        <p:nvPicPr>
-          <p:cNvPr id="10" name="Picture 9"/>
-          <p:cNvPicPr>
-            <a:picLocks noChangeAspect="1"/>
-          </p:cNvPicPr>
-          <p:nvPr/>
-        </p:nvPicPr>
-        <p:blipFill>
-          <a:blip r:embed="rId2">
-            <a:extLst>
-              <a:ext uri="{28A0092B-C50C-407E-A947-70E740481C1C}">
-                <a14:useLocalDpi xmlns:a14="http://schemas.microsoft.com/office/drawing/2010/main" val="0"/>
-              </a:ext>
-            </a:extLst>
-          </a:blip>
-          <a:stretch>
-            <a:fillRect/>
-          </a:stretch>
-        </p:blipFill>
-        <p:spPr>
-          <a:xfrm>
-            <a:off x="0" y="2432856"/>
-            <a:ext cx="4587240" cy="1865706"/>
-          </a:xfrm>
-          <a:prstGeom prst="rect">
-            <a:avLst/>
-          </a:prstGeom>
-        </p:spPr>
-      </p:pic>
-      <p:pic>
-        <p:nvPicPr>
-          <p:cNvPr id="11" name="Picture 10"/>
-          <p:cNvPicPr>
-            <a:picLocks noChangeAspect="1"/>
-          </p:cNvPicPr>
-          <p:nvPr/>
-        </p:nvPicPr>
-        <p:blipFill>
-          <a:blip r:embed="rId3" cstate="print">
-            <a:extLst>
-              <a:ext uri="{28A0092B-C50C-407E-A947-70E740481C1C}">
-                <a14:useLocalDpi xmlns:a14="http://schemas.microsoft.com/office/drawing/2010/main" val="0"/>
-              </a:ext>
-            </a:extLst>
-          </a:blip>
-          <a:stretch>
-            <a:fillRect/>
-          </a:stretch>
-        </p:blipFill>
-        <p:spPr>
-          <a:xfrm>
-            <a:off x="3002280" y="4026166"/>
-            <a:ext cx="6050280" cy="1117334"/>
-          </a:xfrm>
-          <a:prstGeom prst="rect">
-            <a:avLst/>
-          </a:prstGeom>
-        </p:spPr>
-      </p:pic>
-      <p:pic>
-        <p:nvPicPr>
-          <p:cNvPr id="12" name="Picture 11"/>
-          <p:cNvPicPr>
-            <a:picLocks noChangeAspect="1"/>
-          </p:cNvPicPr>
-          <p:nvPr/>
-        </p:nvPicPr>
-        <p:blipFill>
-          <a:blip r:embed="rId4">
-            <a:extLst>
-              <a:ext uri="{28A0092B-C50C-407E-A947-70E740481C1C}">
-                <a14:useLocalDpi xmlns:a14="http://schemas.microsoft.com/office/drawing/2010/main" val="0"/>
-              </a:ext>
-            </a:extLst>
-          </a:blip>
-          <a:stretch>
-            <a:fillRect/>
-          </a:stretch>
-        </p:blipFill>
-        <p:spPr>
-          <a:xfrm>
-            <a:off x="0" y="1903495"/>
-            <a:ext cx="9144000" cy="529360"/>
-          </a:xfrm>
-          <a:prstGeom prst="rect">
-            <a:avLst/>
-          </a:prstGeom>
-        </p:spPr>
-      </p:pic>
-      <p:grpSp>
-        <p:nvGrpSpPr>
-          <p:cNvPr id="9" name="Group 8"/>
-          <p:cNvGrpSpPr/>
-          <p:nvPr/>
-        </p:nvGrpSpPr>
-        <p:grpSpPr>
-          <a:xfrm>
-            <a:off x="1249680" y="1699142"/>
-            <a:ext cx="6339840" cy="3444358"/>
-            <a:chOff x="509752" y="-43130"/>
-            <a:chExt cx="8634248" cy="5509260"/>
-          </a:xfrm>
-        </p:grpSpPr>
-        <p:pic>
-          <p:nvPicPr>
-            <p:cNvPr id="13" name="Picture 12"/>
-            <p:cNvPicPr>
-              <a:picLocks noChangeAspect="1"/>
-            </p:cNvPicPr>
-            <p:nvPr/>
-          </p:nvPicPr>
-          <p:blipFill>
-            <a:blip r:embed="rId5" cstate="print">
-              <a:extLst>
-                <a:ext uri="{28A0092B-C50C-407E-A947-70E740481C1C}">
-                  <a14:useLocalDpi xmlns:a14="http://schemas.microsoft.com/office/drawing/2010/main" val="0"/>
-                </a:ext>
-              </a:extLst>
-            </a:blip>
-            <a:stretch>
-              <a:fillRect/>
-            </a:stretch>
-          </p:blipFill>
-          <p:spPr>
-            <a:xfrm>
-              <a:off x="509752" y="-43130"/>
-              <a:ext cx="3814280" cy="5143500"/>
-            </a:xfrm>
-            <a:prstGeom prst="rect">
-              <a:avLst/>
-            </a:prstGeom>
-          </p:spPr>
-        </p:pic>
-        <p:pic>
-          <p:nvPicPr>
-            <p:cNvPr id="14" name="Picture 13"/>
-            <p:cNvPicPr>
-              <a:picLocks noChangeAspect="1"/>
-            </p:cNvPicPr>
-            <p:nvPr/>
-          </p:nvPicPr>
-          <p:blipFill>
-            <a:blip r:embed="rId6">
-              <a:extLst>
-                <a:ext uri="{28A0092B-C50C-407E-A947-70E740481C1C}">
-                  <a14:useLocalDpi xmlns:a14="http://schemas.microsoft.com/office/drawing/2010/main" val="0"/>
-                </a:ext>
-              </a:extLst>
-            </a:blip>
-            <a:stretch>
-              <a:fillRect/>
-            </a:stretch>
-          </p:blipFill>
-          <p:spPr>
-            <a:xfrm>
-              <a:off x="4324032" y="322630"/>
-              <a:ext cx="4819968" cy="5143500"/>
-            </a:xfrm>
-            <a:prstGeom prst="rect">
-              <a:avLst/>
-            </a:prstGeom>
-          </p:spPr>
-        </p:pic>
-      </p:grpSp>
     </p:spTree>
     <p:extLst>
       <p:ext uri="{BB962C8B-B14F-4D97-AF65-F5344CB8AC3E}">
-        <p14:creationId xmlns:p14="http://schemas.microsoft.com/office/powerpoint/2010/main" val="331543835"/>
+        <p14:creationId xmlns:p14="http://schemas.microsoft.com/office/powerpoint/2010/main" val="2412270642"/>
       </p:ext>
     </p:extLst>
   </p:cSld>
@@ -3656,468 +4011,6 @@
 </file>
 
 <file path=ppt/slides/slide12.xml><?xml version="1.0" encoding="utf-8"?>
-<p:sld xmlns:a="http://schemas.openxmlformats.org/drawingml/2006/main" xmlns:r="http://schemas.openxmlformats.org/officeDocument/2006/relationships" xmlns:p="http://schemas.openxmlformats.org/presentationml/2006/main">
-  <p:cSld>
-    <p:bg>
-      <p:bgPr>
-        <a:solidFill>
-          <a:schemeClr val="bg1"/>
-        </a:solidFill>
-        <a:effectLst/>
-      </p:bgPr>
-    </p:bg>
-    <p:spTree>
-      <p:nvGrpSpPr>
-        <p:cNvPr id="1" name=""/>
-        <p:cNvGrpSpPr/>
-        <p:nvPr/>
-      </p:nvGrpSpPr>
-      <p:grpSpPr>
-        <a:xfrm>
-          <a:off x="0" y="0"/>
-          <a:ext cx="0" cy="0"/>
-          <a:chOff x="0" y="0"/>
-          <a:chExt cx="0" cy="0"/>
-        </a:xfrm>
-      </p:grpSpPr>
-      <p:grpSp>
-        <p:nvGrpSpPr>
-          <p:cNvPr id="4" name="Group 3"/>
-          <p:cNvGrpSpPr/>
-          <p:nvPr/>
-        </p:nvGrpSpPr>
-        <p:grpSpPr>
-          <a:xfrm>
-            <a:off x="75271" y="66909"/>
-            <a:ext cx="4293529" cy="4982612"/>
-            <a:chOff x="-91938" y="29352"/>
-            <a:chExt cx="6963768" cy="6974996"/>
-          </a:xfrm>
-        </p:grpSpPr>
-        <p:pic>
-          <p:nvPicPr>
-            <p:cNvPr id="5" name="Picture 4"/>
-            <p:cNvPicPr>
-              <a:picLocks noChangeAspect="1"/>
-            </p:cNvPicPr>
-            <p:nvPr/>
-          </p:nvPicPr>
-          <p:blipFill>
-            <a:blip r:embed="rId2" cstate="print">
-              <a:extLst>
-                <a:ext uri="{28A0092B-C50C-407E-A947-70E740481C1C}">
-                  <a14:useLocalDpi xmlns:a14="http://schemas.microsoft.com/office/drawing/2010/main" val="0"/>
-                </a:ext>
-              </a:extLst>
-            </a:blip>
-            <a:stretch>
-              <a:fillRect/>
-            </a:stretch>
-          </p:blipFill>
-          <p:spPr>
-            <a:xfrm>
-              <a:off x="-91938" y="29352"/>
-              <a:ext cx="3814280" cy="5143500"/>
-            </a:xfrm>
-            <a:prstGeom prst="rect">
-              <a:avLst/>
-            </a:prstGeom>
-          </p:spPr>
-        </p:pic>
-        <p:pic>
-          <p:nvPicPr>
-            <p:cNvPr id="6" name="Picture 5"/>
-            <p:cNvPicPr>
-              <a:picLocks noChangeAspect="1"/>
-            </p:cNvPicPr>
-            <p:nvPr/>
-          </p:nvPicPr>
-          <p:blipFill>
-            <a:blip r:embed="rId3">
-              <a:extLst>
-                <a:ext uri="{28A0092B-C50C-407E-A947-70E740481C1C}">
-                  <a14:useLocalDpi xmlns:a14="http://schemas.microsoft.com/office/drawing/2010/main" val="0"/>
-                </a:ext>
-              </a:extLst>
-            </a:blip>
-            <a:stretch>
-              <a:fillRect/>
-            </a:stretch>
-          </p:blipFill>
-          <p:spPr>
-            <a:xfrm>
-              <a:off x="2051862" y="1860848"/>
-              <a:ext cx="4819968" cy="5143500"/>
-            </a:xfrm>
-            <a:prstGeom prst="rect">
-              <a:avLst/>
-            </a:prstGeom>
-          </p:spPr>
-        </p:pic>
-      </p:grpSp>
-    </p:spTree>
-    <p:extLst>
-      <p:ext uri="{BB962C8B-B14F-4D97-AF65-F5344CB8AC3E}">
-        <p14:creationId xmlns:p14="http://schemas.microsoft.com/office/powerpoint/2010/main" val="1760095347"/>
-      </p:ext>
-    </p:extLst>
-  </p:cSld>
-  <p:clrMapOvr>
-    <a:masterClrMapping/>
-  </p:clrMapOvr>
-</p:sld>
-</file>
-
-<file path=ppt/slides/slide13.xml><?xml version="1.0" encoding="utf-8"?>
-<p:sld xmlns:a="http://schemas.openxmlformats.org/drawingml/2006/main" xmlns:r="http://schemas.openxmlformats.org/officeDocument/2006/relationships" xmlns:p="http://schemas.openxmlformats.org/presentationml/2006/main">
-  <p:cSld>
-    <p:spTree>
-      <p:nvGrpSpPr>
-        <p:cNvPr id="1" name=""/>
-        <p:cNvGrpSpPr/>
-        <p:nvPr/>
-      </p:nvGrpSpPr>
-      <p:grpSpPr>
-        <a:xfrm>
-          <a:off x="0" y="0"/>
-          <a:ext cx="0" cy="0"/>
-          <a:chOff x="0" y="0"/>
-          <a:chExt cx="0" cy="0"/>
-        </a:xfrm>
-      </p:grpSpPr>
-      <p:sp>
-        <p:nvSpPr>
-          <p:cNvPr id="5" name="Rounded Rectangle 4"/>
-          <p:cNvSpPr/>
-          <p:nvPr/>
-        </p:nvSpPr>
-        <p:spPr>
-          <a:xfrm>
-            <a:off x="3467100" y="190500"/>
-            <a:ext cx="624840" cy="1440180"/>
-          </a:xfrm>
-          <a:prstGeom prst="roundRect">
-            <a:avLst/>
-          </a:prstGeom>
-          <a:solidFill>
-            <a:srgbClr val="FF0000">
-              <a:alpha val="2000"/>
-            </a:srgbClr>
-          </a:solidFill>
-          <a:ln w="12700">
-            <a:prstDash val="dash"/>
-          </a:ln>
-        </p:spPr>
-        <p:style>
-          <a:lnRef idx="1">
-            <a:schemeClr val="dk1"/>
-          </a:lnRef>
-          <a:fillRef idx="2">
-            <a:schemeClr val="dk1"/>
-          </a:fillRef>
-          <a:effectRef idx="1">
-            <a:schemeClr val="dk1"/>
-          </a:effectRef>
-          <a:fontRef idx="minor">
-            <a:schemeClr val="dk1"/>
-          </a:fontRef>
-        </p:style>
-        <p:txBody>
-          <a:bodyPr rot="0" spcFirstLastPara="0" vertOverflow="overflow" horzOverflow="overflow" vert="horz" wrap="square" lIns="91440" tIns="45720" rIns="91440" bIns="45720" numCol="1" spcCol="0" rtlCol="0" fromWordArt="0" anchor="ctr" anchorCtr="0" forceAA="0" compatLnSpc="1">
-            <a:prstTxWarp prst="textNoShape">
-              <a:avLst/>
-            </a:prstTxWarp>
-            <a:noAutofit/>
-          </a:bodyPr>
-          <a:lstStyle/>
-          <a:p>
-            <a:pPr algn="ctr"/>
-            <a:endParaRPr lang="en-US"/>
-          </a:p>
-        </p:txBody>
-      </p:sp>
-    </p:spTree>
-    <p:extLst>
-      <p:ext uri="{BB962C8B-B14F-4D97-AF65-F5344CB8AC3E}">
-        <p14:creationId xmlns:p14="http://schemas.microsoft.com/office/powerpoint/2010/main" val="3984740356"/>
-      </p:ext>
-    </p:extLst>
-  </p:cSld>
-  <p:clrMapOvr>
-    <a:masterClrMapping/>
-  </p:clrMapOvr>
-  <p:timing>
-    <p:tnLst>
-      <p:par>
-        <p:cTn id="1" dur="indefinite" restart="never" nodeType="tmRoot"/>
-      </p:par>
-    </p:tnLst>
-  </p:timing>
-</p:sld>
-</file>
-
-<file path=ppt/slides/slide14.xml><?xml version="1.0" encoding="utf-8"?>
-<p:sld xmlns:a="http://schemas.openxmlformats.org/drawingml/2006/main" xmlns:r="http://schemas.openxmlformats.org/officeDocument/2006/relationships" xmlns:p="http://schemas.openxmlformats.org/presentationml/2006/main">
-  <p:cSld>
-    <p:spTree>
-      <p:nvGrpSpPr>
-        <p:cNvPr id="1" name=""/>
-        <p:cNvGrpSpPr/>
-        <p:nvPr/>
-      </p:nvGrpSpPr>
-      <p:grpSpPr>
-        <a:xfrm>
-          <a:off x="0" y="0"/>
-          <a:ext cx="0" cy="0"/>
-          <a:chOff x="0" y="0"/>
-          <a:chExt cx="0" cy="0"/>
-        </a:xfrm>
-      </p:grpSpPr>
-      <p:grpSp>
-        <p:nvGrpSpPr>
-          <p:cNvPr id="4" name="Group 3"/>
-          <p:cNvGrpSpPr/>
-          <p:nvPr/>
-        </p:nvGrpSpPr>
-        <p:grpSpPr>
-          <a:xfrm>
-            <a:off x="762000" y="2003690"/>
-            <a:ext cx="2600960" cy="3018397"/>
-            <a:chOff x="-91938" y="29352"/>
-            <a:chExt cx="6963767" cy="6974996"/>
-          </a:xfrm>
-        </p:grpSpPr>
-        <p:pic>
-          <p:nvPicPr>
-            <p:cNvPr id="5" name="Picture 4"/>
-            <p:cNvPicPr>
-              <a:picLocks noChangeAspect="1"/>
-            </p:cNvPicPr>
-            <p:nvPr/>
-          </p:nvPicPr>
-          <p:blipFill>
-            <a:blip r:embed="rId2" cstate="print">
-              <a:extLst>
-                <a:ext uri="{28A0092B-C50C-407E-A947-70E740481C1C}">
-                  <a14:useLocalDpi xmlns:a14="http://schemas.microsoft.com/office/drawing/2010/main" val="0"/>
-                </a:ext>
-              </a:extLst>
-            </a:blip>
-            <a:stretch>
-              <a:fillRect/>
-            </a:stretch>
-          </p:blipFill>
-          <p:spPr>
-            <a:xfrm>
-              <a:off x="-91938" y="29352"/>
-              <a:ext cx="3814280" cy="5143500"/>
-            </a:xfrm>
-            <a:prstGeom prst="rect">
-              <a:avLst/>
-            </a:prstGeom>
-          </p:spPr>
-        </p:pic>
-        <p:pic>
-          <p:nvPicPr>
-            <p:cNvPr id="6" name="Picture 5"/>
-            <p:cNvPicPr>
-              <a:picLocks noChangeAspect="1"/>
-            </p:cNvPicPr>
-            <p:nvPr/>
-          </p:nvPicPr>
-          <p:blipFill>
-            <a:blip r:embed="rId3" cstate="print">
-              <a:extLst>
-                <a:ext uri="{28A0092B-C50C-407E-A947-70E740481C1C}">
-                  <a14:useLocalDpi xmlns:a14="http://schemas.microsoft.com/office/drawing/2010/main" val="0"/>
-                </a:ext>
-              </a:extLst>
-            </a:blip>
-            <a:stretch>
-              <a:fillRect/>
-            </a:stretch>
-          </p:blipFill>
-          <p:spPr>
-            <a:xfrm>
-              <a:off x="2051861" y="1860847"/>
-              <a:ext cx="4819968" cy="5143501"/>
-            </a:xfrm>
-            <a:prstGeom prst="rect">
-              <a:avLst/>
-            </a:prstGeom>
-          </p:spPr>
-        </p:pic>
-      </p:grpSp>
-      <p:grpSp>
-        <p:nvGrpSpPr>
-          <p:cNvPr id="7" name="Group 6"/>
-          <p:cNvGrpSpPr/>
-          <p:nvPr/>
-        </p:nvGrpSpPr>
-        <p:grpSpPr>
-          <a:xfrm>
-            <a:off x="5235473" y="2156090"/>
-            <a:ext cx="3104614" cy="2751189"/>
-            <a:chOff x="0" y="0"/>
-            <a:chExt cx="5804247" cy="5143500"/>
-          </a:xfrm>
-        </p:grpSpPr>
-        <p:pic>
-          <p:nvPicPr>
-            <p:cNvPr id="8" name="Picture 7"/>
-            <p:cNvPicPr>
-              <a:picLocks noChangeAspect="1"/>
-            </p:cNvPicPr>
-            <p:nvPr/>
-          </p:nvPicPr>
-          <p:blipFill>
-            <a:blip r:embed="rId4" cstate="print">
-              <a:extLst>
-                <a:ext uri="{28A0092B-C50C-407E-A947-70E740481C1C}">
-                  <a14:useLocalDpi xmlns:a14="http://schemas.microsoft.com/office/drawing/2010/main" val="0"/>
-                </a:ext>
-              </a:extLst>
-            </a:blip>
-            <a:stretch>
-              <a:fillRect/>
-            </a:stretch>
-          </p:blipFill>
-          <p:spPr>
-            <a:xfrm>
-              <a:off x="0" y="0"/>
-              <a:ext cx="4123625" cy="5143500"/>
-            </a:xfrm>
-            <a:prstGeom prst="rect">
-              <a:avLst/>
-            </a:prstGeom>
-          </p:spPr>
-        </p:pic>
-        <p:pic>
-          <p:nvPicPr>
-            <p:cNvPr id="9" name="Picture 8"/>
-            <p:cNvPicPr>
-              <a:picLocks noChangeAspect="1"/>
-            </p:cNvPicPr>
-            <p:nvPr/>
-          </p:nvPicPr>
-          <p:blipFill>
-            <a:blip r:embed="rId5" cstate="print">
-              <a:extLst>
-                <a:ext uri="{28A0092B-C50C-407E-A947-70E740481C1C}">
-                  <a14:useLocalDpi xmlns:a14="http://schemas.microsoft.com/office/drawing/2010/main" val="0"/>
-                </a:ext>
-              </a:extLst>
-            </a:blip>
-            <a:stretch>
-              <a:fillRect/>
-            </a:stretch>
-          </p:blipFill>
-          <p:spPr>
-            <a:xfrm>
-              <a:off x="2856512" y="0"/>
-              <a:ext cx="2534225" cy="3020029"/>
-            </a:xfrm>
-            <a:prstGeom prst="rect">
-              <a:avLst/>
-            </a:prstGeom>
-          </p:spPr>
-        </p:pic>
-        <p:pic>
-          <p:nvPicPr>
-            <p:cNvPr id="10" name="Picture 9"/>
-            <p:cNvPicPr>
-              <a:picLocks noChangeAspect="1"/>
-            </p:cNvPicPr>
-            <p:nvPr/>
-          </p:nvPicPr>
-          <p:blipFill>
-            <a:blip r:embed="rId6" cstate="print">
-              <a:extLst>
-                <a:ext uri="{28A0092B-C50C-407E-A947-70E740481C1C}">
-                  <a14:useLocalDpi xmlns:a14="http://schemas.microsoft.com/office/drawing/2010/main" val="0"/>
-                </a:ext>
-              </a:extLst>
-            </a:blip>
-            <a:stretch>
-              <a:fillRect/>
-            </a:stretch>
-          </p:blipFill>
-          <p:spPr>
-            <a:xfrm>
-              <a:off x="2856512" y="2979685"/>
-              <a:ext cx="2947735" cy="2150367"/>
-            </a:xfrm>
-            <a:prstGeom prst="rect">
-              <a:avLst/>
-            </a:prstGeom>
-          </p:spPr>
-        </p:pic>
-      </p:grpSp>
-      <p:sp>
-        <p:nvSpPr>
-          <p:cNvPr id="11" name="Rounded Rectangle 10"/>
-          <p:cNvSpPr/>
-          <p:nvPr/>
-        </p:nvSpPr>
-        <p:spPr>
-          <a:xfrm>
-            <a:off x="3362960" y="1270000"/>
-            <a:ext cx="2458720" cy="467360"/>
-          </a:xfrm>
-          <a:prstGeom prst="roundRect">
-            <a:avLst/>
-          </a:prstGeom>
-          <a:solidFill>
-            <a:srgbClr val="FF0000">
-              <a:alpha val="2000"/>
-            </a:srgbClr>
-          </a:solidFill>
-          <a:ln w="12700">
-            <a:prstDash val="dash"/>
-          </a:ln>
-        </p:spPr>
-        <p:style>
-          <a:lnRef idx="1">
-            <a:schemeClr val="dk1"/>
-          </a:lnRef>
-          <a:fillRef idx="2">
-            <a:schemeClr val="dk1"/>
-          </a:fillRef>
-          <a:effectRef idx="1">
-            <a:schemeClr val="dk1"/>
-          </a:effectRef>
-          <a:fontRef idx="minor">
-            <a:schemeClr val="dk1"/>
-          </a:fontRef>
-        </p:style>
-        <p:txBody>
-          <a:bodyPr rot="0" spcFirstLastPara="0" vertOverflow="overflow" horzOverflow="overflow" vert="horz" wrap="square" lIns="91440" tIns="45720" rIns="91440" bIns="45720" numCol="1" spcCol="0" rtlCol="0" fromWordArt="0" anchor="ctr" anchorCtr="0" forceAA="0" compatLnSpc="1">
-            <a:prstTxWarp prst="textNoShape">
-              <a:avLst/>
-            </a:prstTxWarp>
-            <a:noAutofit/>
-          </a:bodyPr>
-          <a:lstStyle/>
-          <a:p>
-            <a:pPr algn="ctr"/>
-            <a:endParaRPr lang="en-US"/>
-          </a:p>
-        </p:txBody>
-      </p:sp>
-    </p:spTree>
-    <p:extLst>
-      <p:ext uri="{BB962C8B-B14F-4D97-AF65-F5344CB8AC3E}">
-        <p14:creationId xmlns:p14="http://schemas.microsoft.com/office/powerpoint/2010/main" val="3471049254"/>
-      </p:ext>
-    </p:extLst>
-  </p:cSld>
-  <p:clrMapOvr>
-    <a:masterClrMapping/>
-  </p:clrMapOvr>
-</p:sld>
-</file>
-
-<file path=ppt/slides/slide15.xml><?xml version="1.0" encoding="utf-8"?>
 <p:sld xmlns:a="http://schemas.openxmlformats.org/drawingml/2006/main" xmlns:r="http://schemas.openxmlformats.org/officeDocument/2006/relationships" xmlns:p="http://schemas.openxmlformats.org/presentationml/2006/main">
   <p:cSld>
     <p:bg>
@@ -4342,7 +4235,7 @@
 </p:sld>
 </file>
 
-<file path=ppt/slides/slide16.xml><?xml version="1.0" encoding="utf-8"?>
+<file path=ppt/slides/slide13.xml><?xml version="1.0" encoding="utf-8"?>
 <p:sld xmlns:a="http://schemas.openxmlformats.org/drawingml/2006/main" xmlns:r="http://schemas.openxmlformats.org/officeDocument/2006/relationships" xmlns:p="http://schemas.openxmlformats.org/presentationml/2006/main">
   <p:cSld>
     <p:spTree>
@@ -4414,6 +4307,270 @@
     <p:extLst>
       <p:ext uri="{BB962C8B-B14F-4D97-AF65-F5344CB8AC3E}">
         <p14:creationId xmlns:p14="http://schemas.microsoft.com/office/powerpoint/2010/main" val="2364666172"/>
+      </p:ext>
+    </p:extLst>
+  </p:cSld>
+  <p:clrMapOvr>
+    <a:masterClrMapping/>
+  </p:clrMapOvr>
+  <p:timing>
+    <p:tnLst>
+      <p:par>
+        <p:cTn id="1" dur="indefinite" restart="never" nodeType="tmRoot"/>
+      </p:par>
+    </p:tnLst>
+  </p:timing>
+</p:sld>
+</file>
+
+<file path=ppt/slides/slide14.xml><?xml version="1.0" encoding="utf-8"?>
+<p:sld xmlns:a="http://schemas.openxmlformats.org/drawingml/2006/main" xmlns:r="http://schemas.openxmlformats.org/officeDocument/2006/relationships" xmlns:p="http://schemas.openxmlformats.org/presentationml/2006/main">
+  <p:cSld>
+    <p:spTree>
+      <p:nvGrpSpPr>
+        <p:cNvPr id="1" name=""/>
+        <p:cNvGrpSpPr/>
+        <p:nvPr/>
+      </p:nvGrpSpPr>
+      <p:grpSpPr>
+        <a:xfrm>
+          <a:off x="0" y="0"/>
+          <a:ext cx="0" cy="0"/>
+          <a:chOff x="0" y="0"/>
+          <a:chExt cx="0" cy="0"/>
+        </a:xfrm>
+      </p:grpSpPr>
+      <p:sp>
+        <p:nvSpPr>
+          <p:cNvPr id="5" name="Rounded Rectangle 4"/>
+          <p:cNvSpPr/>
+          <p:nvPr/>
+        </p:nvSpPr>
+        <p:spPr>
+          <a:xfrm>
+            <a:off x="5113020" y="182880"/>
+            <a:ext cx="2026920" cy="441960"/>
+          </a:xfrm>
+          <a:prstGeom prst="roundRect">
+            <a:avLst/>
+          </a:prstGeom>
+          <a:solidFill>
+            <a:srgbClr val="FF0000">
+              <a:alpha val="2000"/>
+            </a:srgbClr>
+          </a:solidFill>
+          <a:ln w="12700">
+            <a:prstDash val="dash"/>
+          </a:ln>
+        </p:spPr>
+        <p:style>
+          <a:lnRef idx="1">
+            <a:schemeClr val="dk1"/>
+          </a:lnRef>
+          <a:fillRef idx="2">
+            <a:schemeClr val="dk1"/>
+          </a:fillRef>
+          <a:effectRef idx="1">
+            <a:schemeClr val="dk1"/>
+          </a:effectRef>
+          <a:fontRef idx="minor">
+            <a:schemeClr val="dk1"/>
+          </a:fontRef>
+        </p:style>
+        <p:txBody>
+          <a:bodyPr rot="0" spcFirstLastPara="0" vertOverflow="overflow" horzOverflow="overflow" vert="horz" wrap="square" lIns="91440" tIns="45720" rIns="91440" bIns="45720" numCol="1" spcCol="0" rtlCol="0" fromWordArt="0" anchor="ctr" anchorCtr="0" forceAA="0" compatLnSpc="1">
+            <a:prstTxWarp prst="textNoShape">
+              <a:avLst/>
+            </a:prstTxWarp>
+            <a:noAutofit/>
+          </a:bodyPr>
+          <a:lstStyle/>
+          <a:p>
+            <a:pPr algn="ctr"/>
+            <a:endParaRPr lang="en-US"/>
+          </a:p>
+        </p:txBody>
+      </p:sp>
+    </p:spTree>
+    <p:extLst>
+      <p:ext uri="{BB962C8B-B14F-4D97-AF65-F5344CB8AC3E}">
+        <p14:creationId xmlns:p14="http://schemas.microsoft.com/office/powerpoint/2010/main" val="2771512955"/>
+      </p:ext>
+    </p:extLst>
+  </p:cSld>
+  <p:clrMapOvr>
+    <a:masterClrMapping/>
+  </p:clrMapOvr>
+  <p:timing>
+    <p:tnLst>
+      <p:par>
+        <p:cTn id="1" dur="indefinite" restart="never" nodeType="tmRoot"/>
+      </p:par>
+    </p:tnLst>
+  </p:timing>
+</p:sld>
+</file>
+
+<file path=ppt/slides/slide15.xml><?xml version="1.0" encoding="utf-8"?>
+<p:sld xmlns:a="http://schemas.openxmlformats.org/drawingml/2006/main" xmlns:r="http://schemas.openxmlformats.org/officeDocument/2006/relationships" xmlns:p="http://schemas.openxmlformats.org/presentationml/2006/main">
+  <p:cSld>
+    <p:spTree>
+      <p:nvGrpSpPr>
+        <p:cNvPr id="1" name=""/>
+        <p:cNvGrpSpPr/>
+        <p:nvPr/>
+      </p:nvGrpSpPr>
+      <p:grpSpPr>
+        <a:xfrm>
+          <a:off x="0" y="0"/>
+          <a:ext cx="0" cy="0"/>
+          <a:chOff x="0" y="0"/>
+          <a:chExt cx="0" cy="0"/>
+        </a:xfrm>
+      </p:grpSpPr>
+      <p:sp>
+        <p:nvSpPr>
+          <p:cNvPr id="5" name="Rounded Rectangle 4"/>
+          <p:cNvSpPr/>
+          <p:nvPr/>
+        </p:nvSpPr>
+        <p:spPr>
+          <a:xfrm>
+            <a:off x="6682740" y="205740"/>
+            <a:ext cx="609600" cy="1485900"/>
+          </a:xfrm>
+          <a:prstGeom prst="roundRect">
+            <a:avLst/>
+          </a:prstGeom>
+          <a:solidFill>
+            <a:srgbClr val="FF0000">
+              <a:alpha val="2000"/>
+            </a:srgbClr>
+          </a:solidFill>
+          <a:ln w="12700">
+            <a:prstDash val="dash"/>
+          </a:ln>
+        </p:spPr>
+        <p:style>
+          <a:lnRef idx="1">
+            <a:schemeClr val="dk1"/>
+          </a:lnRef>
+          <a:fillRef idx="2">
+            <a:schemeClr val="dk1"/>
+          </a:fillRef>
+          <a:effectRef idx="1">
+            <a:schemeClr val="dk1"/>
+          </a:effectRef>
+          <a:fontRef idx="minor">
+            <a:schemeClr val="dk1"/>
+          </a:fontRef>
+        </p:style>
+        <p:txBody>
+          <a:bodyPr rot="0" spcFirstLastPara="0" vertOverflow="overflow" horzOverflow="overflow" vert="horz" wrap="square" lIns="91440" tIns="45720" rIns="91440" bIns="45720" numCol="1" spcCol="0" rtlCol="0" fromWordArt="0" anchor="ctr" anchorCtr="0" forceAA="0" compatLnSpc="1">
+            <a:prstTxWarp prst="textNoShape">
+              <a:avLst/>
+            </a:prstTxWarp>
+            <a:noAutofit/>
+          </a:bodyPr>
+          <a:lstStyle/>
+          <a:p>
+            <a:pPr algn="ctr"/>
+            <a:endParaRPr lang="en-US"/>
+          </a:p>
+        </p:txBody>
+      </p:sp>
+    </p:spTree>
+    <p:extLst>
+      <p:ext uri="{BB962C8B-B14F-4D97-AF65-F5344CB8AC3E}">
+        <p14:creationId xmlns:p14="http://schemas.microsoft.com/office/powerpoint/2010/main" val="3868802154"/>
+      </p:ext>
+    </p:extLst>
+  </p:cSld>
+  <p:clrMapOvr>
+    <a:masterClrMapping/>
+  </p:clrMapOvr>
+  <p:timing>
+    <p:tnLst>
+      <p:par>
+        <p:cTn id="1" dur="indefinite" restart="never" nodeType="tmRoot"/>
+      </p:par>
+    </p:tnLst>
+  </p:timing>
+</p:sld>
+</file>
+
+<file path=ppt/slides/slide16.xml><?xml version="1.0" encoding="utf-8"?>
+<p:sld xmlns:a="http://schemas.openxmlformats.org/drawingml/2006/main" xmlns:r="http://schemas.openxmlformats.org/officeDocument/2006/relationships" xmlns:p="http://schemas.openxmlformats.org/presentationml/2006/main">
+  <p:cSld>
+    <p:spTree>
+      <p:nvGrpSpPr>
+        <p:cNvPr id="1" name=""/>
+        <p:cNvGrpSpPr/>
+        <p:nvPr/>
+      </p:nvGrpSpPr>
+      <p:grpSpPr>
+        <a:xfrm>
+          <a:off x="0" y="0"/>
+          <a:ext cx="0" cy="0"/>
+          <a:chOff x="0" y="0"/>
+          <a:chExt cx="0" cy="0"/>
+        </a:xfrm>
+      </p:grpSpPr>
+      <p:sp>
+        <p:nvSpPr>
+          <p:cNvPr id="3" name="Rounded Rectangle 2"/>
+          <p:cNvSpPr/>
+          <p:nvPr/>
+        </p:nvSpPr>
+        <p:spPr>
+          <a:xfrm>
+            <a:off x="7696200" y="121920"/>
+            <a:ext cx="1348740" cy="1630680"/>
+          </a:xfrm>
+          <a:prstGeom prst="roundRect">
+            <a:avLst/>
+          </a:prstGeom>
+          <a:solidFill>
+            <a:srgbClr val="FF0000">
+              <a:alpha val="2000"/>
+            </a:srgbClr>
+          </a:solidFill>
+          <a:ln w="12700">
+            <a:prstDash val="dash"/>
+          </a:ln>
+        </p:spPr>
+        <p:style>
+          <a:lnRef idx="1">
+            <a:schemeClr val="dk1"/>
+          </a:lnRef>
+          <a:fillRef idx="2">
+            <a:schemeClr val="dk1"/>
+          </a:fillRef>
+          <a:effectRef idx="1">
+            <a:schemeClr val="dk1"/>
+          </a:effectRef>
+          <a:fontRef idx="minor">
+            <a:schemeClr val="dk1"/>
+          </a:fontRef>
+        </p:style>
+        <p:txBody>
+          <a:bodyPr rot="0" spcFirstLastPara="0" vertOverflow="overflow" horzOverflow="overflow" vert="horz" wrap="square" lIns="91440" tIns="45720" rIns="91440" bIns="45720" numCol="1" spcCol="0" rtlCol="0" fromWordArt="0" anchor="ctr" anchorCtr="0" forceAA="0" compatLnSpc="1">
+            <a:prstTxWarp prst="textNoShape">
+              <a:avLst/>
+            </a:prstTxWarp>
+            <a:noAutofit/>
+          </a:bodyPr>
+          <a:lstStyle/>
+          <a:p>
+            <a:pPr algn="ctr"/>
+            <a:endParaRPr lang="en-US"/>
+          </a:p>
+        </p:txBody>
+      </p:sp>
+    </p:spTree>
+    <p:extLst>
+      <p:ext uri="{BB962C8B-B14F-4D97-AF65-F5344CB8AC3E}">
+        <p14:creationId xmlns:p14="http://schemas.microsoft.com/office/powerpoint/2010/main" val="701324909"/>
       </p:ext>
     </p:extLst>
   </p:cSld>
@@ -4447,237 +4604,10 @@
           <a:chExt cx="0" cy="0"/>
         </a:xfrm>
       </p:grpSpPr>
-      <p:sp>
-        <p:nvSpPr>
-          <p:cNvPr id="5" name="Rounded Rectangle 4"/>
-          <p:cNvSpPr/>
-          <p:nvPr/>
-        </p:nvSpPr>
-        <p:spPr>
-          <a:xfrm>
-            <a:off x="5113020" y="182880"/>
-            <a:ext cx="2026920" cy="441960"/>
-          </a:xfrm>
-          <a:prstGeom prst="roundRect">
-            <a:avLst/>
-          </a:prstGeom>
-          <a:solidFill>
-            <a:srgbClr val="FF0000">
-              <a:alpha val="2000"/>
-            </a:srgbClr>
-          </a:solidFill>
-          <a:ln w="12700">
-            <a:prstDash val="dash"/>
-          </a:ln>
-        </p:spPr>
-        <p:style>
-          <a:lnRef idx="1">
-            <a:schemeClr val="dk1"/>
-          </a:lnRef>
-          <a:fillRef idx="2">
-            <a:schemeClr val="dk1"/>
-          </a:fillRef>
-          <a:effectRef idx="1">
-            <a:schemeClr val="dk1"/>
-          </a:effectRef>
-          <a:fontRef idx="minor">
-            <a:schemeClr val="dk1"/>
-          </a:fontRef>
-        </p:style>
-        <p:txBody>
-          <a:bodyPr rot="0" spcFirstLastPara="0" vertOverflow="overflow" horzOverflow="overflow" vert="horz" wrap="square" lIns="91440" tIns="45720" rIns="91440" bIns="45720" numCol="1" spcCol="0" rtlCol="0" fromWordArt="0" anchor="ctr" anchorCtr="0" forceAA="0" compatLnSpc="1">
-            <a:prstTxWarp prst="textNoShape">
-              <a:avLst/>
-            </a:prstTxWarp>
-            <a:noAutofit/>
-          </a:bodyPr>
-          <a:lstStyle/>
-          <a:p>
-            <a:pPr algn="ctr"/>
-            <a:endParaRPr lang="en-US"/>
-          </a:p>
-        </p:txBody>
-      </p:sp>
     </p:spTree>
     <p:extLst>
       <p:ext uri="{BB962C8B-B14F-4D97-AF65-F5344CB8AC3E}">
-        <p14:creationId xmlns:p14="http://schemas.microsoft.com/office/powerpoint/2010/main" val="2771512955"/>
-      </p:ext>
-    </p:extLst>
-  </p:cSld>
-  <p:clrMapOvr>
-    <a:masterClrMapping/>
-  </p:clrMapOvr>
-  <p:timing>
-    <p:tnLst>
-      <p:par>
-        <p:cTn id="1" dur="indefinite" restart="never" nodeType="tmRoot"/>
-      </p:par>
-    </p:tnLst>
-  </p:timing>
-</p:sld>
-</file>
-
-<file path=ppt/slides/slide18.xml><?xml version="1.0" encoding="utf-8"?>
-<p:sld xmlns:a="http://schemas.openxmlformats.org/drawingml/2006/main" xmlns:r="http://schemas.openxmlformats.org/officeDocument/2006/relationships" xmlns:p="http://schemas.openxmlformats.org/presentationml/2006/main">
-  <p:cSld>
-    <p:spTree>
-      <p:nvGrpSpPr>
-        <p:cNvPr id="1" name=""/>
-        <p:cNvGrpSpPr/>
-        <p:nvPr/>
-      </p:nvGrpSpPr>
-      <p:grpSpPr>
-        <a:xfrm>
-          <a:off x="0" y="0"/>
-          <a:ext cx="0" cy="0"/>
-          <a:chOff x="0" y="0"/>
-          <a:chExt cx="0" cy="0"/>
-        </a:xfrm>
-      </p:grpSpPr>
-      <p:sp>
-        <p:nvSpPr>
-          <p:cNvPr id="5" name="Rounded Rectangle 4"/>
-          <p:cNvSpPr/>
-          <p:nvPr/>
-        </p:nvSpPr>
-        <p:spPr>
-          <a:xfrm>
-            <a:off x="6682740" y="205740"/>
-            <a:ext cx="609600" cy="1485900"/>
-          </a:xfrm>
-          <a:prstGeom prst="roundRect">
-            <a:avLst/>
-          </a:prstGeom>
-          <a:solidFill>
-            <a:srgbClr val="FF0000">
-              <a:alpha val="2000"/>
-            </a:srgbClr>
-          </a:solidFill>
-          <a:ln w="12700">
-            <a:prstDash val="dash"/>
-          </a:ln>
-        </p:spPr>
-        <p:style>
-          <a:lnRef idx="1">
-            <a:schemeClr val="dk1"/>
-          </a:lnRef>
-          <a:fillRef idx="2">
-            <a:schemeClr val="dk1"/>
-          </a:fillRef>
-          <a:effectRef idx="1">
-            <a:schemeClr val="dk1"/>
-          </a:effectRef>
-          <a:fontRef idx="minor">
-            <a:schemeClr val="dk1"/>
-          </a:fontRef>
-        </p:style>
-        <p:txBody>
-          <a:bodyPr rot="0" spcFirstLastPara="0" vertOverflow="overflow" horzOverflow="overflow" vert="horz" wrap="square" lIns="91440" tIns="45720" rIns="91440" bIns="45720" numCol="1" spcCol="0" rtlCol="0" fromWordArt="0" anchor="ctr" anchorCtr="0" forceAA="0" compatLnSpc="1">
-            <a:prstTxWarp prst="textNoShape">
-              <a:avLst/>
-            </a:prstTxWarp>
-            <a:noAutofit/>
-          </a:bodyPr>
-          <a:lstStyle/>
-          <a:p>
-            <a:pPr algn="ctr"/>
-            <a:endParaRPr lang="en-US"/>
-          </a:p>
-        </p:txBody>
-      </p:sp>
-    </p:spTree>
-    <p:extLst>
-      <p:ext uri="{BB962C8B-B14F-4D97-AF65-F5344CB8AC3E}">
-        <p14:creationId xmlns:p14="http://schemas.microsoft.com/office/powerpoint/2010/main" val="3868802154"/>
-      </p:ext>
-    </p:extLst>
-  </p:cSld>
-  <p:clrMapOvr>
-    <a:masterClrMapping/>
-  </p:clrMapOvr>
-  <p:timing>
-    <p:tnLst>
-      <p:par>
-        <p:cTn id="1" dur="indefinite" restart="never" nodeType="tmRoot"/>
-      </p:par>
-    </p:tnLst>
-  </p:timing>
-</p:sld>
-</file>
-
-<file path=ppt/slides/slide19.xml><?xml version="1.0" encoding="utf-8"?>
-<p:sld xmlns:a="http://schemas.openxmlformats.org/drawingml/2006/main" xmlns:r="http://schemas.openxmlformats.org/officeDocument/2006/relationships" xmlns:p="http://schemas.openxmlformats.org/presentationml/2006/main">
-  <p:cSld>
-    <p:spTree>
-      <p:nvGrpSpPr>
-        <p:cNvPr id="1" name=""/>
-        <p:cNvGrpSpPr/>
-        <p:nvPr/>
-      </p:nvGrpSpPr>
-      <p:grpSpPr>
-        <a:xfrm>
-          <a:off x="0" y="0"/>
-          <a:ext cx="0" cy="0"/>
-          <a:chOff x="0" y="0"/>
-          <a:chExt cx="0" cy="0"/>
-        </a:xfrm>
-      </p:grpSpPr>
-      <p:sp>
-        <p:nvSpPr>
-          <p:cNvPr id="3" name="Rounded Rectangle 2"/>
-          <p:cNvSpPr/>
-          <p:nvPr/>
-        </p:nvSpPr>
-        <p:spPr>
-          <a:xfrm>
-            <a:off x="7696200" y="121920"/>
-            <a:ext cx="1348740" cy="1630680"/>
-          </a:xfrm>
-          <a:prstGeom prst="roundRect">
-            <a:avLst/>
-          </a:prstGeom>
-          <a:solidFill>
-            <a:srgbClr val="FF0000">
-              <a:alpha val="2000"/>
-            </a:srgbClr>
-          </a:solidFill>
-          <a:ln w="12700">
-            <a:prstDash val="dash"/>
-          </a:ln>
-        </p:spPr>
-        <p:style>
-          <a:lnRef idx="1">
-            <a:schemeClr val="dk1"/>
-          </a:lnRef>
-          <a:fillRef idx="2">
-            <a:schemeClr val="dk1"/>
-          </a:fillRef>
-          <a:effectRef idx="1">
-            <a:schemeClr val="dk1"/>
-          </a:effectRef>
-          <a:fontRef idx="minor">
-            <a:schemeClr val="dk1"/>
-          </a:fontRef>
-        </p:style>
-        <p:txBody>
-          <a:bodyPr rot="0" spcFirstLastPara="0" vertOverflow="overflow" horzOverflow="overflow" vert="horz" wrap="square" lIns="91440" tIns="45720" rIns="91440" bIns="45720" numCol="1" spcCol="0" rtlCol="0" fromWordArt="0" anchor="ctr" anchorCtr="0" forceAA="0" compatLnSpc="1">
-            <a:prstTxWarp prst="textNoShape">
-              <a:avLst/>
-            </a:prstTxWarp>
-            <a:noAutofit/>
-          </a:bodyPr>
-          <a:lstStyle/>
-          <a:p>
-            <a:pPr algn="ctr"/>
-            <a:endParaRPr lang="en-US"/>
-          </a:p>
-        </p:txBody>
-      </p:sp>
-    </p:spTree>
-    <p:extLst>
-      <p:ext uri="{BB962C8B-B14F-4D97-AF65-F5344CB8AC3E}">
-        <p14:creationId xmlns:p14="http://schemas.microsoft.com/office/powerpoint/2010/main" val="701324909"/>
+        <p14:creationId xmlns:p14="http://schemas.microsoft.com/office/powerpoint/2010/main" val="1584045952"/>
       </p:ext>
     </p:extLst>
   </p:cSld>
@@ -4721,36 +4651,6 @@
   <p:clrMapOvr>
     <a:masterClrMapping/>
   </p:clrMapOvr>
-</p:sld>
-</file>
-
-<file path=ppt/slides/slide20.xml><?xml version="1.0" encoding="utf-8"?>
-<p:sld xmlns:a="http://schemas.openxmlformats.org/drawingml/2006/main" xmlns:r="http://schemas.openxmlformats.org/officeDocument/2006/relationships" xmlns:p="http://schemas.openxmlformats.org/presentationml/2006/main">
-  <p:cSld>
-    <p:spTree>
-      <p:nvGrpSpPr>
-        <p:cNvPr id="1" name=""/>
-        <p:cNvGrpSpPr/>
-        <p:nvPr/>
-      </p:nvGrpSpPr>
-      <p:grpSpPr>
-        <a:xfrm>
-          <a:off x="0" y="0"/>
-          <a:ext cx="0" cy="0"/>
-          <a:chOff x="0" y="0"/>
-          <a:chExt cx="0" cy="0"/>
-        </a:xfrm>
-      </p:grpSpPr>
-    </p:spTree>
-    <p:extLst>
-      <p:ext uri="{BB962C8B-B14F-4D97-AF65-F5344CB8AC3E}">
-        <p14:creationId xmlns:p14="http://schemas.microsoft.com/office/powerpoint/2010/main" val="1584045952"/>
-      </p:ext>
-    </p:extLst>
-  </p:cSld>
-  <p:clrMapOvr>
-    <a:masterClrMapping/>
-  </p:clrMapOvr>
   <p:timing>
     <p:tnLst>
       <p:par>
@@ -4758,276 +4658,6 @@
       </p:par>
     </p:tnLst>
   </p:timing>
-</p:sld>
-</file>
-
-<file path=ppt/slides/slide21.xml><?xml version="1.0" encoding="utf-8"?>
-<p:sld xmlns:a="http://schemas.openxmlformats.org/drawingml/2006/main" xmlns:r="http://schemas.openxmlformats.org/officeDocument/2006/relationships" xmlns:p="http://schemas.openxmlformats.org/presentationml/2006/main">
-  <p:cSld>
-    <p:spTree>
-      <p:nvGrpSpPr>
-        <p:cNvPr id="1" name=""/>
-        <p:cNvGrpSpPr/>
-        <p:nvPr/>
-      </p:nvGrpSpPr>
-      <p:grpSpPr>
-        <a:xfrm>
-          <a:off x="0" y="0"/>
-          <a:ext cx="0" cy="0"/>
-          <a:chOff x="0" y="0"/>
-          <a:chExt cx="0" cy="0"/>
-        </a:xfrm>
-      </p:grpSpPr>
-    </p:spTree>
-    <p:extLst>
-      <p:ext uri="{BB962C8B-B14F-4D97-AF65-F5344CB8AC3E}">
-        <p14:creationId xmlns:p14="http://schemas.microsoft.com/office/powerpoint/2010/main" val="2419868181"/>
-      </p:ext>
-    </p:extLst>
-  </p:cSld>
-  <p:clrMapOvr>
-    <a:masterClrMapping/>
-  </p:clrMapOvr>
-</p:sld>
-</file>
-
-<file path=ppt/slides/slide22.xml><?xml version="1.0" encoding="utf-8"?>
-<p:sld xmlns:a="http://schemas.openxmlformats.org/drawingml/2006/main" xmlns:r="http://schemas.openxmlformats.org/officeDocument/2006/relationships" xmlns:p="http://schemas.openxmlformats.org/presentationml/2006/main">
-  <p:cSld>
-    <p:spTree>
-      <p:nvGrpSpPr>
-        <p:cNvPr id="1" name=""/>
-        <p:cNvGrpSpPr/>
-        <p:nvPr/>
-      </p:nvGrpSpPr>
-      <p:grpSpPr>
-        <a:xfrm>
-          <a:off x="0" y="0"/>
-          <a:ext cx="0" cy="0"/>
-          <a:chOff x="0" y="0"/>
-          <a:chExt cx="0" cy="0"/>
-        </a:xfrm>
-      </p:grpSpPr>
-    </p:spTree>
-    <p:extLst>
-      <p:ext uri="{BB962C8B-B14F-4D97-AF65-F5344CB8AC3E}">
-        <p14:creationId xmlns:p14="http://schemas.microsoft.com/office/powerpoint/2010/main" val="2719592432"/>
-      </p:ext>
-    </p:extLst>
-  </p:cSld>
-  <p:clrMapOvr>
-    <a:masterClrMapping/>
-  </p:clrMapOvr>
-</p:sld>
-</file>
-
-<file path=ppt/slides/slide23.xml><?xml version="1.0" encoding="utf-8"?>
-<p:sld xmlns:a="http://schemas.openxmlformats.org/drawingml/2006/main" xmlns:r="http://schemas.openxmlformats.org/officeDocument/2006/relationships" xmlns:p="http://schemas.openxmlformats.org/presentationml/2006/main">
-  <p:cSld>
-    <p:spTree>
-      <p:nvGrpSpPr>
-        <p:cNvPr id="1" name=""/>
-        <p:cNvGrpSpPr/>
-        <p:nvPr/>
-      </p:nvGrpSpPr>
-      <p:grpSpPr>
-        <a:xfrm>
-          <a:off x="0" y="0"/>
-          <a:ext cx="0" cy="0"/>
-          <a:chOff x="0" y="0"/>
-          <a:chExt cx="0" cy="0"/>
-        </a:xfrm>
-      </p:grpSpPr>
-    </p:spTree>
-    <p:extLst>
-      <p:ext uri="{BB962C8B-B14F-4D97-AF65-F5344CB8AC3E}">
-        <p14:creationId xmlns:p14="http://schemas.microsoft.com/office/powerpoint/2010/main" val="1922042404"/>
-      </p:ext>
-    </p:extLst>
-  </p:cSld>
-  <p:clrMapOvr>
-    <a:masterClrMapping/>
-  </p:clrMapOvr>
-</p:sld>
-</file>
-
-<file path=ppt/slides/slide24.xml><?xml version="1.0" encoding="utf-8"?>
-<p:sld xmlns:a="http://schemas.openxmlformats.org/drawingml/2006/main" xmlns:r="http://schemas.openxmlformats.org/officeDocument/2006/relationships" xmlns:p="http://schemas.openxmlformats.org/presentationml/2006/main">
-  <p:cSld>
-    <p:spTree>
-      <p:nvGrpSpPr>
-        <p:cNvPr id="1" name=""/>
-        <p:cNvGrpSpPr/>
-        <p:nvPr/>
-      </p:nvGrpSpPr>
-      <p:grpSpPr>
-        <a:xfrm>
-          <a:off x="0" y="0"/>
-          <a:ext cx="0" cy="0"/>
-          <a:chOff x="0" y="0"/>
-          <a:chExt cx="0" cy="0"/>
-        </a:xfrm>
-      </p:grpSpPr>
-    </p:spTree>
-    <p:extLst>
-      <p:ext uri="{BB962C8B-B14F-4D97-AF65-F5344CB8AC3E}">
-        <p14:creationId xmlns:p14="http://schemas.microsoft.com/office/powerpoint/2010/main" val="711019165"/>
-      </p:ext>
-    </p:extLst>
-  </p:cSld>
-  <p:clrMapOvr>
-    <a:masterClrMapping/>
-  </p:clrMapOvr>
-</p:sld>
-</file>
-
-<file path=ppt/slides/slide25.xml><?xml version="1.0" encoding="utf-8"?>
-<p:sld xmlns:a="http://schemas.openxmlformats.org/drawingml/2006/main" xmlns:r="http://schemas.openxmlformats.org/officeDocument/2006/relationships" xmlns:p="http://schemas.openxmlformats.org/presentationml/2006/main">
-  <p:cSld>
-    <p:spTree>
-      <p:nvGrpSpPr>
-        <p:cNvPr id="1" name=""/>
-        <p:cNvGrpSpPr/>
-        <p:nvPr/>
-      </p:nvGrpSpPr>
-      <p:grpSpPr>
-        <a:xfrm>
-          <a:off x="0" y="0"/>
-          <a:ext cx="0" cy="0"/>
-          <a:chOff x="0" y="0"/>
-          <a:chExt cx="0" cy="0"/>
-        </a:xfrm>
-      </p:grpSpPr>
-    </p:spTree>
-    <p:extLst>
-      <p:ext uri="{BB962C8B-B14F-4D97-AF65-F5344CB8AC3E}">
-        <p14:creationId xmlns:p14="http://schemas.microsoft.com/office/powerpoint/2010/main" val="3214367139"/>
-      </p:ext>
-    </p:extLst>
-  </p:cSld>
-  <p:clrMapOvr>
-    <a:masterClrMapping/>
-  </p:clrMapOvr>
-</p:sld>
-</file>
-
-<file path=ppt/slides/slide26.xml><?xml version="1.0" encoding="utf-8"?>
-<p:sld xmlns:a="http://schemas.openxmlformats.org/drawingml/2006/main" xmlns:r="http://schemas.openxmlformats.org/officeDocument/2006/relationships" xmlns:p="http://schemas.openxmlformats.org/presentationml/2006/main">
-  <p:cSld>
-    <p:spTree>
-      <p:nvGrpSpPr>
-        <p:cNvPr id="1" name=""/>
-        <p:cNvGrpSpPr/>
-        <p:nvPr/>
-      </p:nvGrpSpPr>
-      <p:grpSpPr>
-        <a:xfrm>
-          <a:off x="0" y="0"/>
-          <a:ext cx="0" cy="0"/>
-          <a:chOff x="0" y="0"/>
-          <a:chExt cx="0" cy="0"/>
-        </a:xfrm>
-      </p:grpSpPr>
-    </p:spTree>
-    <p:extLst>
-      <p:ext uri="{BB962C8B-B14F-4D97-AF65-F5344CB8AC3E}">
-        <p14:creationId xmlns:p14="http://schemas.microsoft.com/office/powerpoint/2010/main" val="2704817187"/>
-      </p:ext>
-    </p:extLst>
-  </p:cSld>
-  <p:clrMapOvr>
-    <a:masterClrMapping/>
-  </p:clrMapOvr>
-</p:sld>
-</file>
-
-<file path=ppt/slides/slide27.xml><?xml version="1.0" encoding="utf-8"?>
-<p:sld xmlns:a="http://schemas.openxmlformats.org/drawingml/2006/main" xmlns:r="http://schemas.openxmlformats.org/officeDocument/2006/relationships" xmlns:p="http://schemas.openxmlformats.org/presentationml/2006/main">
-  <p:cSld>
-    <p:spTree>
-      <p:nvGrpSpPr>
-        <p:cNvPr id="1" name=""/>
-        <p:cNvGrpSpPr/>
-        <p:nvPr/>
-      </p:nvGrpSpPr>
-      <p:grpSpPr>
-        <a:xfrm>
-          <a:off x="0" y="0"/>
-          <a:ext cx="0" cy="0"/>
-          <a:chOff x="0" y="0"/>
-          <a:chExt cx="0" cy="0"/>
-        </a:xfrm>
-      </p:grpSpPr>
-    </p:spTree>
-    <p:extLst>
-      <p:ext uri="{BB962C8B-B14F-4D97-AF65-F5344CB8AC3E}">
-        <p14:creationId xmlns:p14="http://schemas.microsoft.com/office/powerpoint/2010/main" val="3136429545"/>
-      </p:ext>
-    </p:extLst>
-  </p:cSld>
-  <p:clrMapOvr>
-    <a:masterClrMapping/>
-  </p:clrMapOvr>
-</p:sld>
-</file>
-
-<file path=ppt/slides/slide28.xml><?xml version="1.0" encoding="utf-8"?>
-<p:sld xmlns:a="http://schemas.openxmlformats.org/drawingml/2006/main" xmlns:r="http://schemas.openxmlformats.org/officeDocument/2006/relationships" xmlns:p="http://schemas.openxmlformats.org/presentationml/2006/main">
-  <p:cSld>
-    <p:spTree>
-      <p:nvGrpSpPr>
-        <p:cNvPr id="1" name=""/>
-        <p:cNvGrpSpPr/>
-        <p:nvPr/>
-      </p:nvGrpSpPr>
-      <p:grpSpPr>
-        <a:xfrm>
-          <a:off x="0" y="0"/>
-          <a:ext cx="0" cy="0"/>
-          <a:chOff x="0" y="0"/>
-          <a:chExt cx="0" cy="0"/>
-        </a:xfrm>
-      </p:grpSpPr>
-    </p:spTree>
-    <p:extLst>
-      <p:ext uri="{BB962C8B-B14F-4D97-AF65-F5344CB8AC3E}">
-        <p14:creationId xmlns:p14="http://schemas.microsoft.com/office/powerpoint/2010/main" val="1286557180"/>
-      </p:ext>
-    </p:extLst>
-  </p:cSld>
-  <p:clrMapOvr>
-    <a:masterClrMapping/>
-  </p:clrMapOvr>
-</p:sld>
-</file>
-
-<file path=ppt/slides/slide29.xml><?xml version="1.0" encoding="utf-8"?>
-<p:sld xmlns:a="http://schemas.openxmlformats.org/drawingml/2006/main" xmlns:r="http://schemas.openxmlformats.org/officeDocument/2006/relationships" xmlns:p="http://schemas.openxmlformats.org/presentationml/2006/main">
-  <p:cSld>
-    <p:spTree>
-      <p:nvGrpSpPr>
-        <p:cNvPr id="1" name=""/>
-        <p:cNvGrpSpPr/>
-        <p:nvPr/>
-      </p:nvGrpSpPr>
-      <p:grpSpPr>
-        <a:xfrm>
-          <a:off x="0" y="0"/>
-          <a:ext cx="0" cy="0"/>
-          <a:chOff x="0" y="0"/>
-          <a:chExt cx="0" cy="0"/>
-        </a:xfrm>
-      </p:grpSpPr>
-    </p:spTree>
-    <p:extLst>
-      <p:ext uri="{BB962C8B-B14F-4D97-AF65-F5344CB8AC3E}">
-        <p14:creationId xmlns:p14="http://schemas.microsoft.com/office/powerpoint/2010/main" val="1020577071"/>
-      </p:ext>
-    </p:extLst>
-  </p:cSld>
-  <p:clrMapOvr>
-    <a:masterClrMapping/>
-  </p:clrMapOvr>
 </p:sld>
 </file>
 
@@ -5068,313 +4698,6 @@
 </p:sld>
 </file>
 
-<file path=ppt/slides/slide30.xml><?xml version="1.0" encoding="utf-8"?>
-<p:sld xmlns:a="http://schemas.openxmlformats.org/drawingml/2006/main" xmlns:r="http://schemas.openxmlformats.org/officeDocument/2006/relationships" xmlns:p="http://schemas.openxmlformats.org/presentationml/2006/main">
-  <p:cSld>
-    <p:spTree>
-      <p:nvGrpSpPr>
-        <p:cNvPr id="1" name=""/>
-        <p:cNvGrpSpPr/>
-        <p:nvPr/>
-      </p:nvGrpSpPr>
-      <p:grpSpPr>
-        <a:xfrm>
-          <a:off x="0" y="0"/>
-          <a:ext cx="0" cy="0"/>
-          <a:chOff x="0" y="0"/>
-          <a:chExt cx="0" cy="0"/>
-        </a:xfrm>
-      </p:grpSpPr>
-    </p:spTree>
-    <p:extLst>
-      <p:ext uri="{BB962C8B-B14F-4D97-AF65-F5344CB8AC3E}">
-        <p14:creationId xmlns:p14="http://schemas.microsoft.com/office/powerpoint/2010/main" val="112546500"/>
-      </p:ext>
-    </p:extLst>
-  </p:cSld>
-  <p:clrMapOvr>
-    <a:masterClrMapping/>
-  </p:clrMapOvr>
-</p:sld>
-</file>
-
-<file path=ppt/slides/slide31.xml><?xml version="1.0" encoding="utf-8"?>
-<p:sld xmlns:a="http://schemas.openxmlformats.org/drawingml/2006/main" xmlns:r="http://schemas.openxmlformats.org/officeDocument/2006/relationships" xmlns:p="http://schemas.openxmlformats.org/presentationml/2006/main">
-  <p:cSld>
-    <p:spTree>
-      <p:nvGrpSpPr>
-        <p:cNvPr id="1" name=""/>
-        <p:cNvGrpSpPr/>
-        <p:nvPr/>
-      </p:nvGrpSpPr>
-      <p:grpSpPr>
-        <a:xfrm>
-          <a:off x="0" y="0"/>
-          <a:ext cx="0" cy="0"/>
-          <a:chOff x="0" y="0"/>
-          <a:chExt cx="0" cy="0"/>
-        </a:xfrm>
-      </p:grpSpPr>
-    </p:spTree>
-    <p:extLst>
-      <p:ext uri="{BB962C8B-B14F-4D97-AF65-F5344CB8AC3E}">
-        <p14:creationId xmlns:p14="http://schemas.microsoft.com/office/powerpoint/2010/main" val="1490018139"/>
-      </p:ext>
-    </p:extLst>
-  </p:cSld>
-  <p:clrMapOvr>
-    <a:masterClrMapping/>
-  </p:clrMapOvr>
-</p:sld>
-</file>
-
-<file path=ppt/slides/slide32.xml><?xml version="1.0" encoding="utf-8"?>
-<p:sld xmlns:a="http://schemas.openxmlformats.org/drawingml/2006/main" xmlns:r="http://schemas.openxmlformats.org/officeDocument/2006/relationships" xmlns:p="http://schemas.openxmlformats.org/presentationml/2006/main">
-  <p:cSld>
-    <p:spTree>
-      <p:nvGrpSpPr>
-        <p:cNvPr id="1" name=""/>
-        <p:cNvGrpSpPr/>
-        <p:nvPr/>
-      </p:nvGrpSpPr>
-      <p:grpSpPr>
-        <a:xfrm>
-          <a:off x="0" y="0"/>
-          <a:ext cx="0" cy="0"/>
-          <a:chOff x="0" y="0"/>
-          <a:chExt cx="0" cy="0"/>
-        </a:xfrm>
-      </p:grpSpPr>
-    </p:spTree>
-    <p:extLst>
-      <p:ext uri="{BB962C8B-B14F-4D97-AF65-F5344CB8AC3E}">
-        <p14:creationId xmlns:p14="http://schemas.microsoft.com/office/powerpoint/2010/main" val="3113966636"/>
-      </p:ext>
-    </p:extLst>
-  </p:cSld>
-  <p:clrMapOvr>
-    <a:masterClrMapping/>
-  </p:clrMapOvr>
-  <p:timing>
-    <p:tnLst>
-      <p:par>
-        <p:cTn id="1" dur="indefinite" restart="never" nodeType="tmRoot"/>
-      </p:par>
-    </p:tnLst>
-  </p:timing>
-</p:sld>
-</file>
-
-<file path=ppt/slides/slide33.xml><?xml version="1.0" encoding="utf-8"?>
-<p:sld xmlns:a="http://schemas.openxmlformats.org/drawingml/2006/main" xmlns:r="http://schemas.openxmlformats.org/officeDocument/2006/relationships" xmlns:p="http://schemas.openxmlformats.org/presentationml/2006/main">
-  <p:cSld>
-    <p:spTree>
-      <p:nvGrpSpPr>
-        <p:cNvPr id="1" name=""/>
-        <p:cNvGrpSpPr/>
-        <p:nvPr/>
-      </p:nvGrpSpPr>
-      <p:grpSpPr>
-        <a:xfrm>
-          <a:off x="0" y="0"/>
-          <a:ext cx="0" cy="0"/>
-          <a:chOff x="0" y="0"/>
-          <a:chExt cx="0" cy="0"/>
-        </a:xfrm>
-      </p:grpSpPr>
-    </p:spTree>
-    <p:extLst>
-      <p:ext uri="{BB962C8B-B14F-4D97-AF65-F5344CB8AC3E}">
-        <p14:creationId xmlns:p14="http://schemas.microsoft.com/office/powerpoint/2010/main" val="3957274953"/>
-      </p:ext>
-    </p:extLst>
-  </p:cSld>
-  <p:clrMapOvr>
-    <a:masterClrMapping/>
-  </p:clrMapOvr>
-</p:sld>
-</file>
-
-<file path=ppt/slides/slide34.xml><?xml version="1.0" encoding="utf-8"?>
-<p:sld xmlns:a="http://schemas.openxmlformats.org/drawingml/2006/main" xmlns:r="http://schemas.openxmlformats.org/officeDocument/2006/relationships" xmlns:p="http://schemas.openxmlformats.org/presentationml/2006/main">
-  <p:cSld>
-    <p:spTree>
-      <p:nvGrpSpPr>
-        <p:cNvPr id="1" name=""/>
-        <p:cNvGrpSpPr/>
-        <p:nvPr/>
-      </p:nvGrpSpPr>
-      <p:grpSpPr>
-        <a:xfrm>
-          <a:off x="0" y="0"/>
-          <a:ext cx="0" cy="0"/>
-          <a:chOff x="0" y="0"/>
-          <a:chExt cx="0" cy="0"/>
-        </a:xfrm>
-      </p:grpSpPr>
-    </p:spTree>
-    <p:extLst>
-      <p:ext uri="{BB962C8B-B14F-4D97-AF65-F5344CB8AC3E}">
-        <p14:creationId xmlns:p14="http://schemas.microsoft.com/office/powerpoint/2010/main" val="67727394"/>
-      </p:ext>
-    </p:extLst>
-  </p:cSld>
-  <p:clrMapOvr>
-    <a:masterClrMapping/>
-  </p:clrMapOvr>
-</p:sld>
-</file>
-
-<file path=ppt/slides/slide35.xml><?xml version="1.0" encoding="utf-8"?>
-<p:sld xmlns:a="http://schemas.openxmlformats.org/drawingml/2006/main" xmlns:r="http://schemas.openxmlformats.org/officeDocument/2006/relationships" xmlns:p="http://schemas.openxmlformats.org/presentationml/2006/main">
-  <p:cSld>
-    <p:spTree>
-      <p:nvGrpSpPr>
-        <p:cNvPr id="1" name=""/>
-        <p:cNvGrpSpPr/>
-        <p:nvPr/>
-      </p:nvGrpSpPr>
-      <p:grpSpPr>
-        <a:xfrm>
-          <a:off x="0" y="0"/>
-          <a:ext cx="0" cy="0"/>
-          <a:chOff x="0" y="0"/>
-          <a:chExt cx="0" cy="0"/>
-        </a:xfrm>
-      </p:grpSpPr>
-    </p:spTree>
-    <p:extLst>
-      <p:ext uri="{BB962C8B-B14F-4D97-AF65-F5344CB8AC3E}">
-        <p14:creationId xmlns:p14="http://schemas.microsoft.com/office/powerpoint/2010/main" val="249501422"/>
-      </p:ext>
-    </p:extLst>
-  </p:cSld>
-  <p:clrMapOvr>
-    <a:masterClrMapping/>
-  </p:clrMapOvr>
-</p:sld>
-</file>
-
-<file path=ppt/slides/slide36.xml><?xml version="1.0" encoding="utf-8"?>
-<p:sld xmlns:a="http://schemas.openxmlformats.org/drawingml/2006/main" xmlns:r="http://schemas.openxmlformats.org/officeDocument/2006/relationships" xmlns:p="http://schemas.openxmlformats.org/presentationml/2006/main">
-  <p:cSld>
-    <p:spTree>
-      <p:nvGrpSpPr>
-        <p:cNvPr id="1" name=""/>
-        <p:cNvGrpSpPr/>
-        <p:nvPr/>
-      </p:nvGrpSpPr>
-      <p:grpSpPr>
-        <a:xfrm>
-          <a:off x="0" y="0"/>
-          <a:ext cx="0" cy="0"/>
-          <a:chOff x="0" y="0"/>
-          <a:chExt cx="0" cy="0"/>
-        </a:xfrm>
-      </p:grpSpPr>
-    </p:spTree>
-    <p:extLst>
-      <p:ext uri="{BB962C8B-B14F-4D97-AF65-F5344CB8AC3E}">
-        <p14:creationId xmlns:p14="http://schemas.microsoft.com/office/powerpoint/2010/main" val="3086060041"/>
-      </p:ext>
-    </p:extLst>
-  </p:cSld>
-  <p:clrMapOvr>
-    <a:masterClrMapping/>
-  </p:clrMapOvr>
-</p:sld>
-</file>
-
-<file path=ppt/slides/slide37.xml><?xml version="1.0" encoding="utf-8"?>
-<p:sld xmlns:a="http://schemas.openxmlformats.org/drawingml/2006/main" xmlns:r="http://schemas.openxmlformats.org/officeDocument/2006/relationships" xmlns:p="http://schemas.openxmlformats.org/presentationml/2006/main">
-  <p:cSld>
-    <p:spTree>
-      <p:nvGrpSpPr>
-        <p:cNvPr id="1" name=""/>
-        <p:cNvGrpSpPr/>
-        <p:nvPr/>
-      </p:nvGrpSpPr>
-      <p:grpSpPr>
-        <a:xfrm>
-          <a:off x="0" y="0"/>
-          <a:ext cx="0" cy="0"/>
-          <a:chOff x="0" y="0"/>
-          <a:chExt cx="0" cy="0"/>
-        </a:xfrm>
-      </p:grpSpPr>
-    </p:spTree>
-    <p:extLst>
-      <p:ext uri="{BB962C8B-B14F-4D97-AF65-F5344CB8AC3E}">
-        <p14:creationId xmlns:p14="http://schemas.microsoft.com/office/powerpoint/2010/main" val="3863056024"/>
-      </p:ext>
-    </p:extLst>
-  </p:cSld>
-  <p:clrMapOvr>
-    <a:masterClrMapping/>
-  </p:clrMapOvr>
-</p:sld>
-</file>
-
-<file path=ppt/slides/slide38.xml><?xml version="1.0" encoding="utf-8"?>
-<p:sld xmlns:a="http://schemas.openxmlformats.org/drawingml/2006/main" xmlns:r="http://schemas.openxmlformats.org/officeDocument/2006/relationships" xmlns:p="http://schemas.openxmlformats.org/presentationml/2006/main">
-  <p:cSld>
-    <p:spTree>
-      <p:nvGrpSpPr>
-        <p:cNvPr id="1" name=""/>
-        <p:cNvGrpSpPr/>
-        <p:nvPr/>
-      </p:nvGrpSpPr>
-      <p:grpSpPr>
-        <a:xfrm>
-          <a:off x="0" y="0"/>
-          <a:ext cx="0" cy="0"/>
-          <a:chOff x="0" y="0"/>
-          <a:chExt cx="0" cy="0"/>
-        </a:xfrm>
-      </p:grpSpPr>
-    </p:spTree>
-    <p:extLst>
-      <p:ext uri="{BB962C8B-B14F-4D97-AF65-F5344CB8AC3E}">
-        <p14:creationId xmlns:p14="http://schemas.microsoft.com/office/powerpoint/2010/main" val="3545912781"/>
-      </p:ext>
-    </p:extLst>
-  </p:cSld>
-  <p:clrMapOvr>
-    <a:masterClrMapping/>
-  </p:clrMapOvr>
-</p:sld>
-</file>
-
-<file path=ppt/slides/slide39.xml><?xml version="1.0" encoding="utf-8"?>
-<p:sld xmlns:a="http://schemas.openxmlformats.org/drawingml/2006/main" xmlns:r="http://schemas.openxmlformats.org/officeDocument/2006/relationships" xmlns:p="http://schemas.openxmlformats.org/presentationml/2006/main">
-  <p:cSld>
-    <p:spTree>
-      <p:nvGrpSpPr>
-        <p:cNvPr id="1" name=""/>
-        <p:cNvGrpSpPr/>
-        <p:nvPr/>
-      </p:nvGrpSpPr>
-      <p:grpSpPr>
-        <a:xfrm>
-          <a:off x="0" y="0"/>
-          <a:ext cx="0" cy="0"/>
-          <a:chOff x="0" y="0"/>
-          <a:chExt cx="0" cy="0"/>
-        </a:xfrm>
-      </p:grpSpPr>
-    </p:spTree>
-    <p:extLst>
-      <p:ext uri="{BB962C8B-B14F-4D97-AF65-F5344CB8AC3E}">
-        <p14:creationId xmlns:p14="http://schemas.microsoft.com/office/powerpoint/2010/main" val="1919565682"/>
-      </p:ext>
-    </p:extLst>
-  </p:cSld>
-  <p:clrMapOvr>
-    <a:masterClrMapping/>
-  </p:clrMapOvr>
-</p:sld>
-</file>
-
 <file path=ppt/slides/slide4.xml><?xml version="1.0" encoding="utf-8"?>
 <p:sld xmlns:a="http://schemas.openxmlformats.org/drawingml/2006/main" xmlns:r="http://schemas.openxmlformats.org/officeDocument/2006/relationships" xmlns:p="http://schemas.openxmlformats.org/presentationml/2006/main">
   <p:cSld>
@@ -5632,246 +4955,6 @@
       </p:par>
     </p:tnLst>
   </p:timing>
-</p:sld>
-</file>
-
-<file path=ppt/slides/slide40.xml><?xml version="1.0" encoding="utf-8"?>
-<p:sld xmlns:a="http://schemas.openxmlformats.org/drawingml/2006/main" xmlns:r="http://schemas.openxmlformats.org/officeDocument/2006/relationships" xmlns:p="http://schemas.openxmlformats.org/presentationml/2006/main">
-  <p:cSld>
-    <p:spTree>
-      <p:nvGrpSpPr>
-        <p:cNvPr id="1" name=""/>
-        <p:cNvGrpSpPr/>
-        <p:nvPr/>
-      </p:nvGrpSpPr>
-      <p:grpSpPr>
-        <a:xfrm>
-          <a:off x="0" y="0"/>
-          <a:ext cx="0" cy="0"/>
-          <a:chOff x="0" y="0"/>
-          <a:chExt cx="0" cy="0"/>
-        </a:xfrm>
-      </p:grpSpPr>
-    </p:spTree>
-    <p:extLst>
-      <p:ext uri="{BB962C8B-B14F-4D97-AF65-F5344CB8AC3E}">
-        <p14:creationId xmlns:p14="http://schemas.microsoft.com/office/powerpoint/2010/main" val="3340717957"/>
-      </p:ext>
-    </p:extLst>
-  </p:cSld>
-  <p:clrMapOvr>
-    <a:masterClrMapping/>
-  </p:clrMapOvr>
-</p:sld>
-</file>
-
-<file path=ppt/slides/slide41.xml><?xml version="1.0" encoding="utf-8"?>
-<p:sld xmlns:a="http://schemas.openxmlformats.org/drawingml/2006/main" xmlns:r="http://schemas.openxmlformats.org/officeDocument/2006/relationships" xmlns:p="http://schemas.openxmlformats.org/presentationml/2006/main">
-  <p:cSld>
-    <p:spTree>
-      <p:nvGrpSpPr>
-        <p:cNvPr id="1" name=""/>
-        <p:cNvGrpSpPr/>
-        <p:nvPr/>
-      </p:nvGrpSpPr>
-      <p:grpSpPr>
-        <a:xfrm>
-          <a:off x="0" y="0"/>
-          <a:ext cx="0" cy="0"/>
-          <a:chOff x="0" y="0"/>
-          <a:chExt cx="0" cy="0"/>
-        </a:xfrm>
-      </p:grpSpPr>
-    </p:spTree>
-    <p:extLst>
-      <p:ext uri="{BB962C8B-B14F-4D97-AF65-F5344CB8AC3E}">
-        <p14:creationId xmlns:p14="http://schemas.microsoft.com/office/powerpoint/2010/main" val="1862177308"/>
-      </p:ext>
-    </p:extLst>
-  </p:cSld>
-  <p:clrMapOvr>
-    <a:masterClrMapping/>
-  </p:clrMapOvr>
-</p:sld>
-</file>
-
-<file path=ppt/slides/slide42.xml><?xml version="1.0" encoding="utf-8"?>
-<p:sld xmlns:a="http://schemas.openxmlformats.org/drawingml/2006/main" xmlns:r="http://schemas.openxmlformats.org/officeDocument/2006/relationships" xmlns:p="http://schemas.openxmlformats.org/presentationml/2006/main">
-  <p:cSld>
-    <p:spTree>
-      <p:nvGrpSpPr>
-        <p:cNvPr id="1" name=""/>
-        <p:cNvGrpSpPr/>
-        <p:nvPr/>
-      </p:nvGrpSpPr>
-      <p:grpSpPr>
-        <a:xfrm>
-          <a:off x="0" y="0"/>
-          <a:ext cx="0" cy="0"/>
-          <a:chOff x="0" y="0"/>
-          <a:chExt cx="0" cy="0"/>
-        </a:xfrm>
-      </p:grpSpPr>
-    </p:spTree>
-    <p:extLst>
-      <p:ext uri="{BB962C8B-B14F-4D97-AF65-F5344CB8AC3E}">
-        <p14:creationId xmlns:p14="http://schemas.microsoft.com/office/powerpoint/2010/main" val="2958375949"/>
-      </p:ext>
-    </p:extLst>
-  </p:cSld>
-  <p:clrMapOvr>
-    <a:masterClrMapping/>
-  </p:clrMapOvr>
-</p:sld>
-</file>
-
-<file path=ppt/slides/slide43.xml><?xml version="1.0" encoding="utf-8"?>
-<p:sld xmlns:a="http://schemas.openxmlformats.org/drawingml/2006/main" xmlns:r="http://schemas.openxmlformats.org/officeDocument/2006/relationships" xmlns:p="http://schemas.openxmlformats.org/presentationml/2006/main">
-  <p:cSld>
-    <p:spTree>
-      <p:nvGrpSpPr>
-        <p:cNvPr id="1" name=""/>
-        <p:cNvGrpSpPr/>
-        <p:nvPr/>
-      </p:nvGrpSpPr>
-      <p:grpSpPr>
-        <a:xfrm>
-          <a:off x="0" y="0"/>
-          <a:ext cx="0" cy="0"/>
-          <a:chOff x="0" y="0"/>
-          <a:chExt cx="0" cy="0"/>
-        </a:xfrm>
-      </p:grpSpPr>
-    </p:spTree>
-    <p:extLst>
-      <p:ext uri="{BB962C8B-B14F-4D97-AF65-F5344CB8AC3E}">
-        <p14:creationId xmlns:p14="http://schemas.microsoft.com/office/powerpoint/2010/main" val="3352251543"/>
-      </p:ext>
-    </p:extLst>
-  </p:cSld>
-  <p:clrMapOvr>
-    <a:masterClrMapping/>
-  </p:clrMapOvr>
-</p:sld>
-</file>
-
-<file path=ppt/slides/slide44.xml><?xml version="1.0" encoding="utf-8"?>
-<p:sld xmlns:a="http://schemas.openxmlformats.org/drawingml/2006/main" xmlns:r="http://schemas.openxmlformats.org/officeDocument/2006/relationships" xmlns:p="http://schemas.openxmlformats.org/presentationml/2006/main">
-  <p:cSld>
-    <p:spTree>
-      <p:nvGrpSpPr>
-        <p:cNvPr id="1" name=""/>
-        <p:cNvGrpSpPr/>
-        <p:nvPr/>
-      </p:nvGrpSpPr>
-      <p:grpSpPr>
-        <a:xfrm>
-          <a:off x="0" y="0"/>
-          <a:ext cx="0" cy="0"/>
-          <a:chOff x="0" y="0"/>
-          <a:chExt cx="0" cy="0"/>
-        </a:xfrm>
-      </p:grpSpPr>
-    </p:spTree>
-    <p:extLst>
-      <p:ext uri="{BB962C8B-B14F-4D97-AF65-F5344CB8AC3E}">
-        <p14:creationId xmlns:p14="http://schemas.microsoft.com/office/powerpoint/2010/main" val="3256230811"/>
-      </p:ext>
-    </p:extLst>
-  </p:cSld>
-  <p:clrMapOvr>
-    <a:masterClrMapping/>
-  </p:clrMapOvr>
-</p:sld>
-</file>
-
-<file path=ppt/slides/slide45.xml><?xml version="1.0" encoding="utf-8"?>
-<p:sld xmlns:a="http://schemas.openxmlformats.org/drawingml/2006/main" xmlns:r="http://schemas.openxmlformats.org/officeDocument/2006/relationships" xmlns:p="http://schemas.openxmlformats.org/presentationml/2006/main">
-  <p:cSld>
-    <p:spTree>
-      <p:nvGrpSpPr>
-        <p:cNvPr id="1" name=""/>
-        <p:cNvGrpSpPr/>
-        <p:nvPr/>
-      </p:nvGrpSpPr>
-      <p:grpSpPr>
-        <a:xfrm>
-          <a:off x="0" y="0"/>
-          <a:ext cx="0" cy="0"/>
-          <a:chOff x="0" y="0"/>
-          <a:chExt cx="0" cy="0"/>
-        </a:xfrm>
-      </p:grpSpPr>
-    </p:spTree>
-    <p:extLst>
-      <p:ext uri="{BB962C8B-B14F-4D97-AF65-F5344CB8AC3E}">
-        <p14:creationId xmlns:p14="http://schemas.microsoft.com/office/powerpoint/2010/main" val="1254283239"/>
-      </p:ext>
-    </p:extLst>
-  </p:cSld>
-  <p:clrMapOvr>
-    <a:masterClrMapping/>
-  </p:clrMapOvr>
-</p:sld>
-</file>
-
-<file path=ppt/slides/slide46.xml><?xml version="1.0" encoding="utf-8"?>
-<p:sld xmlns:a="http://schemas.openxmlformats.org/drawingml/2006/main" xmlns:r="http://schemas.openxmlformats.org/officeDocument/2006/relationships" xmlns:p="http://schemas.openxmlformats.org/presentationml/2006/main">
-  <p:cSld>
-    <p:spTree>
-      <p:nvGrpSpPr>
-        <p:cNvPr id="1" name=""/>
-        <p:cNvGrpSpPr/>
-        <p:nvPr/>
-      </p:nvGrpSpPr>
-      <p:grpSpPr>
-        <a:xfrm>
-          <a:off x="0" y="0"/>
-          <a:ext cx="0" cy="0"/>
-          <a:chOff x="0" y="0"/>
-          <a:chExt cx="0" cy="0"/>
-        </a:xfrm>
-      </p:grpSpPr>
-    </p:spTree>
-    <p:extLst>
-      <p:ext uri="{BB962C8B-B14F-4D97-AF65-F5344CB8AC3E}">
-        <p14:creationId xmlns:p14="http://schemas.microsoft.com/office/powerpoint/2010/main" val="3859042783"/>
-      </p:ext>
-    </p:extLst>
-  </p:cSld>
-  <p:clrMapOvr>
-    <a:masterClrMapping/>
-  </p:clrMapOvr>
-</p:sld>
-</file>
-
-<file path=ppt/slides/slide47.xml><?xml version="1.0" encoding="utf-8"?>
-<p:sld xmlns:a="http://schemas.openxmlformats.org/drawingml/2006/main" xmlns:r="http://schemas.openxmlformats.org/officeDocument/2006/relationships" xmlns:p="http://schemas.openxmlformats.org/presentationml/2006/main">
-  <p:cSld>
-    <p:spTree>
-      <p:nvGrpSpPr>
-        <p:cNvPr id="1" name=""/>
-        <p:cNvGrpSpPr/>
-        <p:nvPr/>
-      </p:nvGrpSpPr>
-      <p:grpSpPr>
-        <a:xfrm>
-          <a:off x="0" y="0"/>
-          <a:ext cx="0" cy="0"/>
-          <a:chOff x="0" y="0"/>
-          <a:chExt cx="0" cy="0"/>
-        </a:xfrm>
-      </p:grpSpPr>
-    </p:spTree>
-    <p:extLst>
-      <p:ext uri="{BB962C8B-B14F-4D97-AF65-F5344CB8AC3E}">
-        <p14:creationId xmlns:p14="http://schemas.microsoft.com/office/powerpoint/2010/main" val="2477691859"/>
-      </p:ext>
-    </p:extLst>
-  </p:cSld>
-  <p:clrMapOvr>
-    <a:masterClrMapping/>
-  </p:clrMapOvr>
 </p:sld>
 </file>
 
@@ -6223,14 +5306,6 @@
 <file path=ppt/slides/slide7.xml><?xml version="1.0" encoding="utf-8"?>
 <p:sld xmlns:a="http://schemas.openxmlformats.org/drawingml/2006/main" xmlns:r="http://schemas.openxmlformats.org/officeDocument/2006/relationships" xmlns:p="http://schemas.openxmlformats.org/presentationml/2006/main">
   <p:cSld>
-    <p:bg>
-      <p:bgPr>
-        <a:solidFill>
-          <a:schemeClr val="bg1"/>
-        </a:solidFill>
-        <a:effectLst/>
-      </p:bgPr>
-    </p:bg>
     <p:spTree>
       <p:nvGrpSpPr>
         <p:cNvPr id="1" name=""/>
@@ -6245,9 +5320,60 @@
           <a:chExt cx="0" cy="0"/>
         </a:xfrm>
       </p:grpSpPr>
+      <p:sp>
+        <p:nvSpPr>
+          <p:cNvPr id="5" name="Rounded Rectangle 4"/>
+          <p:cNvSpPr/>
+          <p:nvPr/>
+        </p:nvSpPr>
+        <p:spPr>
+          <a:xfrm>
+            <a:off x="541020" y="160020"/>
+            <a:ext cx="688340" cy="472440"/>
+          </a:xfrm>
+          <a:prstGeom prst="roundRect">
+            <a:avLst/>
+          </a:prstGeom>
+          <a:solidFill>
+            <a:srgbClr val="FF0000">
+              <a:alpha val="2000"/>
+            </a:srgbClr>
+          </a:solidFill>
+          <a:ln w="12700">
+            <a:prstDash val="dash"/>
+          </a:ln>
+        </p:spPr>
+        <p:style>
+          <a:lnRef idx="1">
+            <a:schemeClr val="dk1"/>
+          </a:lnRef>
+          <a:fillRef idx="2">
+            <a:schemeClr val="dk1"/>
+          </a:fillRef>
+          <a:effectRef idx="1">
+            <a:schemeClr val="dk1"/>
+          </a:effectRef>
+          <a:fontRef idx="minor">
+            <a:schemeClr val="dk1"/>
+          </a:fontRef>
+        </p:style>
+        <p:txBody>
+          <a:bodyPr rot="0" spcFirstLastPara="0" vertOverflow="overflow" horzOverflow="overflow" vert="horz" wrap="square" lIns="91440" tIns="45720" rIns="91440" bIns="45720" numCol="1" spcCol="0" rtlCol="0" fromWordArt="0" anchor="ctr" anchorCtr="0" forceAA="0" compatLnSpc="1">
+            <a:prstTxWarp prst="textNoShape">
+              <a:avLst/>
+            </a:prstTxWarp>
+            <a:noAutofit/>
+          </a:bodyPr>
+          <a:lstStyle/>
+          <a:p>
+            <a:pPr algn="ctr"/>
+            <a:endParaRPr lang="en-US"/>
+          </a:p>
+        </p:txBody>
+      </p:sp>
       <p:pic>
         <p:nvPicPr>
-          <p:cNvPr id="4" name="Picture 3"/>
+          <p:cNvPr id="14" name="Picture 13"/>
           <p:cNvPicPr>
             <a:picLocks noChangeAspect="1"/>
           </p:cNvPicPr>
@@ -6267,7 +5393,7 @@
         </p:blipFill>
         <p:spPr>
           <a:xfrm>
-            <a:off x="1428750" y="0"/>
+            <a:off x="1335322" y="0"/>
             <a:ext cx="7715250" cy="5143500"/>
           </a:xfrm>
           <a:prstGeom prst="rect">
@@ -6278,7 +5404,7 @@
     </p:spTree>
     <p:extLst>
       <p:ext uri="{BB962C8B-B14F-4D97-AF65-F5344CB8AC3E}">
-        <p14:creationId xmlns:p14="http://schemas.microsoft.com/office/powerpoint/2010/main" val="3870057932"/>
+        <p14:creationId xmlns:p14="http://schemas.microsoft.com/office/powerpoint/2010/main" val="3421295939"/>
       </p:ext>
     </p:extLst>
   </p:cSld>
@@ -6320,8 +5446,8 @@
         </p:nvSpPr>
         <p:spPr>
           <a:xfrm>
-            <a:off x="541020" y="160020"/>
-            <a:ext cx="1836420" cy="472440"/>
+            <a:off x="509693" y="193151"/>
+            <a:ext cx="1835942" cy="472440"/>
           </a:xfrm>
           <a:prstGeom prst="roundRect">
             <a:avLst/>
@@ -6363,10 +5489,40 @@
           </a:p>
         </p:txBody>
       </p:sp>
+      <p:pic>
+        <p:nvPicPr>
+          <p:cNvPr id="12" name="Picture 11"/>
+          <p:cNvPicPr>
+            <a:picLocks noChangeAspect="1"/>
+          </p:cNvPicPr>
+          <p:nvPr/>
+        </p:nvPicPr>
+        <p:blipFill>
+          <a:blip r:embed="rId2">
+            <a:extLst>
+              <a:ext uri="{28A0092B-C50C-407E-A947-70E740481C1C}">
+                <a14:useLocalDpi xmlns:a14="http://schemas.microsoft.com/office/drawing/2010/main" val="0"/>
+              </a:ext>
+            </a:extLst>
+          </a:blip>
+          <a:stretch>
+            <a:fillRect/>
+          </a:stretch>
+        </p:blipFill>
+        <p:spPr>
+          <a:xfrm>
+            <a:off x="0" y="4614140"/>
+            <a:ext cx="9144000" cy="529360"/>
+          </a:xfrm>
+          <a:prstGeom prst="rect">
+            <a:avLst/>
+          </a:prstGeom>
+        </p:spPr>
+      </p:pic>
     </p:spTree>
     <p:extLst>
       <p:ext uri="{BB962C8B-B14F-4D97-AF65-F5344CB8AC3E}">
-        <p14:creationId xmlns:p14="http://schemas.microsoft.com/office/powerpoint/2010/main" val="4289195920"/>
+        <p14:creationId xmlns:p14="http://schemas.microsoft.com/office/powerpoint/2010/main" val="1613626613"/>
       </p:ext>
     </p:extLst>
   </p:cSld>
@@ -6460,7 +5616,7 @@
           <p:nvPr/>
         </p:nvPicPr>
         <p:blipFill>
-          <a:blip r:embed="rId2">
+          <a:blip r:embed="rId2" cstate="print">
             <a:extLst>
               <a:ext uri="{28A0092B-C50C-407E-A947-70E740481C1C}">
                 <a14:useLocalDpi xmlns:a14="http://schemas.microsoft.com/office/drawing/2010/main" val="0"/>
@@ -6473,8 +5629,8 @@
         </p:blipFill>
         <p:spPr>
           <a:xfrm>
-            <a:off x="0" y="2432856"/>
-            <a:ext cx="4587240" cy="1865706"/>
+            <a:off x="197809" y="2467664"/>
+            <a:ext cx="2544008" cy="1034690"/>
           </a:xfrm>
           <a:prstGeom prst="rect">
             <a:avLst/>
@@ -6503,8 +5659,8 @@
         </p:blipFill>
         <p:spPr>
           <a:xfrm>
-            <a:off x="3002280" y="4026166"/>
-            <a:ext cx="6050280" cy="1117334"/>
+            <a:off x="62886" y="3697266"/>
+            <a:ext cx="4039280" cy="745953"/>
           </a:xfrm>
           <a:prstGeom prst="rect">
             <a:avLst/>
@@ -6533,7 +5689,7 @@
         </p:blipFill>
         <p:spPr>
           <a:xfrm>
-            <a:off x="0" y="1903495"/>
+            <a:off x="0" y="4614140"/>
             <a:ext cx="9144000" cy="529360"/>
           </a:xfrm>
           <a:prstGeom prst="rect">
@@ -6544,7 +5700,7 @@
     </p:spTree>
     <p:extLst>
       <p:ext uri="{BB962C8B-B14F-4D97-AF65-F5344CB8AC3E}">
-        <p14:creationId xmlns:p14="http://schemas.microsoft.com/office/powerpoint/2010/main" val="4204448265"/>
+        <p14:creationId xmlns:p14="http://schemas.microsoft.com/office/powerpoint/2010/main" val="4011797488"/>
       </p:ext>
     </p:extLst>
   </p:cSld>

</xml_diff>